<commit_message>
Finish; gitignore; test pdf
</commit_message>
<xml_diff>
--- a/Week 1/week_1.pptx
+++ b/Week 1/week_1.pptx
@@ -5,20 +5,28 @@
     <p:sldMasterId id="2147483659" r:id="rId1"/>
   </p:sldMasterIdLst>
   <p:notesMasterIdLst>
-    <p:notesMasterId r:id="rId10"/>
+    <p:notesMasterId r:id="rId18"/>
   </p:notesMasterIdLst>
   <p:handoutMasterIdLst>
-    <p:handoutMasterId r:id="rId11"/>
+    <p:handoutMasterId r:id="rId19"/>
   </p:handoutMasterIdLst>
   <p:sldIdLst>
     <p:sldId id="335" r:id="rId2"/>
-    <p:sldId id="336" r:id="rId3"/>
-    <p:sldId id="338" r:id="rId4"/>
-    <p:sldId id="340" r:id="rId5"/>
-    <p:sldId id="339" r:id="rId6"/>
-    <p:sldId id="341" r:id="rId7"/>
-    <p:sldId id="342" r:id="rId8"/>
-    <p:sldId id="289" r:id="rId9"/>
+    <p:sldId id="346" r:id="rId3"/>
+    <p:sldId id="336" r:id="rId4"/>
+    <p:sldId id="338" r:id="rId5"/>
+    <p:sldId id="340" r:id="rId6"/>
+    <p:sldId id="339" r:id="rId7"/>
+    <p:sldId id="341" r:id="rId8"/>
+    <p:sldId id="342" r:id="rId9"/>
+    <p:sldId id="343" r:id="rId10"/>
+    <p:sldId id="344" r:id="rId11"/>
+    <p:sldId id="345" r:id="rId12"/>
+    <p:sldId id="350" r:id="rId13"/>
+    <p:sldId id="347" r:id="rId14"/>
+    <p:sldId id="348" r:id="rId15"/>
+    <p:sldId id="349" r:id="rId16"/>
+    <p:sldId id="289" r:id="rId17"/>
   </p:sldIdLst>
   <p:sldSz cx="9144000" cy="6858000" type="screen4x3"/>
   <p:notesSz cx="6997700" cy="9283700"/>
@@ -1197,7 +1205,7 @@
             </a:pPr>
             <a:r>
               <a:rPr lang="en-US" dirty="0"/>
-              <a:t>Welcome everyone</a:t>
+              <a:t>Welcome everyone, Thank you for joining this session.</a:t>
             </a:r>
             <a:endParaRPr lang="en-US" altLang="en-US" dirty="0">
               <a:latin typeface="Times New Roman" panose="02020603050405020304" pitchFamily="18" charset="0"/>
@@ -1213,7 +1221,911 @@
 </p:notes>
 </file>
 
+<file path=ppt/notesSlides/notesSlide10.xml><?xml version="1.0" encoding="utf-8"?>
+<p:notes xmlns:a="http://schemas.openxmlformats.org/drawingml/2006/main" xmlns:r="http://schemas.openxmlformats.org/officeDocument/2006/relationships" xmlns:p="http://schemas.openxmlformats.org/presentationml/2006/main">
+  <p:cSld>
+    <p:spTree>
+      <p:nvGrpSpPr>
+        <p:cNvPr id="1" name="">
+          <a:extLst>
+            <a:ext uri="{FF2B5EF4-FFF2-40B4-BE49-F238E27FC236}">
+              <a16:creationId xmlns:a16="http://schemas.microsoft.com/office/drawing/2014/main" id="{C932D850-DB15-CF09-F5D2-ECBDA298C239}"/>
+            </a:ext>
+          </a:extLst>
+        </p:cNvPr>
+        <p:cNvGrpSpPr/>
+        <p:nvPr/>
+      </p:nvGrpSpPr>
+      <p:grpSpPr>
+        <a:xfrm>
+          <a:off x="0" y="0"/>
+          <a:ext cx="0" cy="0"/>
+          <a:chOff x="0" y="0"/>
+          <a:chExt cx="0" cy="0"/>
+        </a:xfrm>
+      </p:grpSpPr>
+      <p:sp>
+        <p:nvSpPr>
+          <p:cNvPr id="2" name="Slide Image Placeholder 1">
+            <a:extLst>
+              <a:ext uri="{FF2B5EF4-FFF2-40B4-BE49-F238E27FC236}">
+                <a16:creationId xmlns:a16="http://schemas.microsoft.com/office/drawing/2014/main" id="{8FA2CF5E-743C-0548-37AE-A4616FBBF7E2}"/>
+              </a:ext>
+            </a:extLst>
+          </p:cNvPr>
+          <p:cNvSpPr>
+            <a:spLocks noGrp="1" noRot="1" noChangeAspect="1"/>
+          </p:cNvSpPr>
+          <p:nvPr>
+            <p:ph type="sldImg"/>
+          </p:nvPr>
+        </p:nvSpPr>
+        <p:spPr/>
+      </p:sp>
+      <p:sp>
+        <p:nvSpPr>
+          <p:cNvPr id="3" name="Notes Placeholder 2">
+            <a:extLst>
+              <a:ext uri="{FF2B5EF4-FFF2-40B4-BE49-F238E27FC236}">
+                <a16:creationId xmlns:a16="http://schemas.microsoft.com/office/drawing/2014/main" id="{E5136FD1-401F-C704-16E1-5472D2A4688C}"/>
+              </a:ext>
+            </a:extLst>
+          </p:cNvPr>
+          <p:cNvSpPr>
+            <a:spLocks noGrp="1"/>
+          </p:cNvSpPr>
+          <p:nvPr>
+            <p:ph type="body" idx="1"/>
+          </p:nvPr>
+        </p:nvSpPr>
+        <p:spPr/>
+        <p:txBody>
+          <a:bodyPr/>
+          <a:lstStyle/>
+          <a:p>
+            <a:endParaRPr lang="en-US" dirty="0"/>
+          </a:p>
+        </p:txBody>
+      </p:sp>
+      <p:sp>
+        <p:nvSpPr>
+          <p:cNvPr id="4" name="Slide Number Placeholder 3">
+            <a:extLst>
+              <a:ext uri="{FF2B5EF4-FFF2-40B4-BE49-F238E27FC236}">
+                <a16:creationId xmlns:a16="http://schemas.microsoft.com/office/drawing/2014/main" id="{BD0F1DDF-4D4A-8E74-5CC5-B31AACC9726E}"/>
+              </a:ext>
+            </a:extLst>
+          </p:cNvPr>
+          <p:cNvSpPr>
+            <a:spLocks noGrp="1"/>
+          </p:cNvSpPr>
+          <p:nvPr>
+            <p:ph type="sldNum" sz="quarter" idx="5"/>
+          </p:nvPr>
+        </p:nvSpPr>
+        <p:spPr/>
+        <p:txBody>
+          <a:bodyPr/>
+          <a:lstStyle/>
+          <a:p>
+            <a:pPr>
+              <a:defRPr/>
+            </a:pPr>
+            <a:fld id="{AE66C03C-4B0E-4149-8287-A3B340EB818D}" type="slidenum">
+              <a:rPr lang="en-US" altLang="en-US" smtClean="0"/>
+              <a:pPr>
+                <a:defRPr/>
+              </a:pPr>
+              <a:t>10</a:t>
+            </a:fld>
+            <a:endParaRPr lang="en-US" altLang="en-US"/>
+          </a:p>
+        </p:txBody>
+      </p:sp>
+    </p:spTree>
+    <p:extLst>
+      <p:ext uri="{BB962C8B-B14F-4D97-AF65-F5344CB8AC3E}">
+        <p14:creationId xmlns:p14="http://schemas.microsoft.com/office/powerpoint/2010/main" val="2482968396"/>
+      </p:ext>
+    </p:extLst>
+  </p:cSld>
+  <p:clrMapOvr>
+    <a:masterClrMapping/>
+  </p:clrMapOvr>
+</p:notes>
+</file>
+
+<file path=ppt/notesSlides/notesSlide11.xml><?xml version="1.0" encoding="utf-8"?>
+<p:notes xmlns:a="http://schemas.openxmlformats.org/drawingml/2006/main" xmlns:r="http://schemas.openxmlformats.org/officeDocument/2006/relationships" xmlns:p="http://schemas.openxmlformats.org/presentationml/2006/main">
+  <p:cSld>
+    <p:spTree>
+      <p:nvGrpSpPr>
+        <p:cNvPr id="1" name="">
+          <a:extLst>
+            <a:ext uri="{FF2B5EF4-FFF2-40B4-BE49-F238E27FC236}">
+              <a16:creationId xmlns:a16="http://schemas.microsoft.com/office/drawing/2014/main" id="{A786ADD9-02FE-61EE-BC57-9E77AB3F858D}"/>
+            </a:ext>
+          </a:extLst>
+        </p:cNvPr>
+        <p:cNvGrpSpPr/>
+        <p:nvPr/>
+      </p:nvGrpSpPr>
+      <p:grpSpPr>
+        <a:xfrm>
+          <a:off x="0" y="0"/>
+          <a:ext cx="0" cy="0"/>
+          <a:chOff x="0" y="0"/>
+          <a:chExt cx="0" cy="0"/>
+        </a:xfrm>
+      </p:grpSpPr>
+      <p:sp>
+        <p:nvSpPr>
+          <p:cNvPr id="2" name="Slide Image Placeholder 1">
+            <a:extLst>
+              <a:ext uri="{FF2B5EF4-FFF2-40B4-BE49-F238E27FC236}">
+                <a16:creationId xmlns:a16="http://schemas.microsoft.com/office/drawing/2014/main" id="{90D58B5C-F44C-8FA3-BB2B-34DEACBD2BCB}"/>
+              </a:ext>
+            </a:extLst>
+          </p:cNvPr>
+          <p:cNvSpPr>
+            <a:spLocks noGrp="1" noRot="1" noChangeAspect="1"/>
+          </p:cNvSpPr>
+          <p:nvPr>
+            <p:ph type="sldImg"/>
+          </p:nvPr>
+        </p:nvSpPr>
+        <p:spPr/>
+      </p:sp>
+      <p:sp>
+        <p:nvSpPr>
+          <p:cNvPr id="3" name="Notes Placeholder 2">
+            <a:extLst>
+              <a:ext uri="{FF2B5EF4-FFF2-40B4-BE49-F238E27FC236}">
+                <a16:creationId xmlns:a16="http://schemas.microsoft.com/office/drawing/2014/main" id="{3E62E730-C675-1931-0EE7-C2FE8CB0B140}"/>
+              </a:ext>
+            </a:extLst>
+          </p:cNvPr>
+          <p:cNvSpPr>
+            <a:spLocks noGrp="1"/>
+          </p:cNvSpPr>
+          <p:nvPr>
+            <p:ph type="body" idx="1"/>
+          </p:nvPr>
+        </p:nvSpPr>
+        <p:spPr/>
+        <p:txBody>
+          <a:bodyPr/>
+          <a:lstStyle/>
+          <a:p>
+            <a:endParaRPr lang="en-US" dirty="0"/>
+          </a:p>
+        </p:txBody>
+      </p:sp>
+      <p:sp>
+        <p:nvSpPr>
+          <p:cNvPr id="4" name="Slide Number Placeholder 3">
+            <a:extLst>
+              <a:ext uri="{FF2B5EF4-FFF2-40B4-BE49-F238E27FC236}">
+                <a16:creationId xmlns:a16="http://schemas.microsoft.com/office/drawing/2014/main" id="{9353FEB4-1B17-9D3D-3A34-4427B8A5ADE0}"/>
+              </a:ext>
+            </a:extLst>
+          </p:cNvPr>
+          <p:cNvSpPr>
+            <a:spLocks noGrp="1"/>
+          </p:cNvSpPr>
+          <p:nvPr>
+            <p:ph type="sldNum" sz="quarter" idx="5"/>
+          </p:nvPr>
+        </p:nvSpPr>
+        <p:spPr/>
+        <p:txBody>
+          <a:bodyPr/>
+          <a:lstStyle/>
+          <a:p>
+            <a:pPr>
+              <a:defRPr/>
+            </a:pPr>
+            <a:fld id="{AE66C03C-4B0E-4149-8287-A3B340EB818D}" type="slidenum">
+              <a:rPr lang="en-US" altLang="en-US" smtClean="0"/>
+              <a:pPr>
+                <a:defRPr/>
+              </a:pPr>
+              <a:t>11</a:t>
+            </a:fld>
+            <a:endParaRPr lang="en-US" altLang="en-US"/>
+          </a:p>
+        </p:txBody>
+      </p:sp>
+    </p:spTree>
+    <p:extLst>
+      <p:ext uri="{BB962C8B-B14F-4D97-AF65-F5344CB8AC3E}">
+        <p14:creationId xmlns:p14="http://schemas.microsoft.com/office/powerpoint/2010/main" val="43243567"/>
+      </p:ext>
+    </p:extLst>
+  </p:cSld>
+  <p:clrMapOvr>
+    <a:masterClrMapping/>
+  </p:clrMapOvr>
+</p:notes>
+</file>
+
+<file path=ppt/notesSlides/notesSlide12.xml><?xml version="1.0" encoding="utf-8"?>
+<p:notes xmlns:a="http://schemas.openxmlformats.org/drawingml/2006/main" xmlns:r="http://schemas.openxmlformats.org/officeDocument/2006/relationships" xmlns:p="http://schemas.openxmlformats.org/presentationml/2006/main">
+  <p:cSld>
+    <p:spTree>
+      <p:nvGrpSpPr>
+        <p:cNvPr id="1" name="">
+          <a:extLst>
+            <a:ext uri="{FF2B5EF4-FFF2-40B4-BE49-F238E27FC236}">
+              <a16:creationId xmlns:a16="http://schemas.microsoft.com/office/drawing/2014/main" id="{D6164EAD-795C-EDFE-7696-386C82E49CDD}"/>
+            </a:ext>
+          </a:extLst>
+        </p:cNvPr>
+        <p:cNvGrpSpPr/>
+        <p:nvPr/>
+      </p:nvGrpSpPr>
+      <p:grpSpPr>
+        <a:xfrm>
+          <a:off x="0" y="0"/>
+          <a:ext cx="0" cy="0"/>
+          <a:chOff x="0" y="0"/>
+          <a:chExt cx="0" cy="0"/>
+        </a:xfrm>
+      </p:grpSpPr>
+      <p:sp>
+        <p:nvSpPr>
+          <p:cNvPr id="2" name="Slide Image Placeholder 1">
+            <a:extLst>
+              <a:ext uri="{FF2B5EF4-FFF2-40B4-BE49-F238E27FC236}">
+                <a16:creationId xmlns:a16="http://schemas.microsoft.com/office/drawing/2014/main" id="{0C99899E-C198-BF80-33F3-0C2A4CA79CE2}"/>
+              </a:ext>
+            </a:extLst>
+          </p:cNvPr>
+          <p:cNvSpPr>
+            <a:spLocks noGrp="1" noRot="1" noChangeAspect="1"/>
+          </p:cNvSpPr>
+          <p:nvPr>
+            <p:ph type="sldImg"/>
+          </p:nvPr>
+        </p:nvSpPr>
+        <p:spPr/>
+      </p:sp>
+      <p:sp>
+        <p:nvSpPr>
+          <p:cNvPr id="3" name="Notes Placeholder 2">
+            <a:extLst>
+              <a:ext uri="{FF2B5EF4-FFF2-40B4-BE49-F238E27FC236}">
+                <a16:creationId xmlns:a16="http://schemas.microsoft.com/office/drawing/2014/main" id="{B89E2BE4-3078-8D2B-5551-DBF26AF0D929}"/>
+              </a:ext>
+            </a:extLst>
+          </p:cNvPr>
+          <p:cNvSpPr>
+            <a:spLocks noGrp="1"/>
+          </p:cNvSpPr>
+          <p:nvPr>
+            <p:ph type="body" idx="1"/>
+          </p:nvPr>
+        </p:nvSpPr>
+        <p:spPr/>
+        <p:txBody>
+          <a:bodyPr/>
+          <a:lstStyle/>
+          <a:p>
+            <a:pPr marL="0" indent="0">
+              <a:buNone/>
+            </a:pPr>
+            <a:r>
+              <a:rPr lang="en-US" sz="1200" dirty="0"/>
+              <a:t>We encourage you to use the online interpreter, which the link and the QR code can be found on Appendix (go to that page)</a:t>
+            </a:r>
+            <a:endParaRPr lang="en-US" dirty="0"/>
+          </a:p>
+        </p:txBody>
+      </p:sp>
+      <p:sp>
+        <p:nvSpPr>
+          <p:cNvPr id="4" name="Slide Number Placeholder 3">
+            <a:extLst>
+              <a:ext uri="{FF2B5EF4-FFF2-40B4-BE49-F238E27FC236}">
+                <a16:creationId xmlns:a16="http://schemas.microsoft.com/office/drawing/2014/main" id="{BAE8C760-EF03-95EE-5EA5-ECC5A1CB2FE3}"/>
+              </a:ext>
+            </a:extLst>
+          </p:cNvPr>
+          <p:cNvSpPr>
+            <a:spLocks noGrp="1"/>
+          </p:cNvSpPr>
+          <p:nvPr>
+            <p:ph type="sldNum" sz="quarter" idx="5"/>
+          </p:nvPr>
+        </p:nvSpPr>
+        <p:spPr/>
+        <p:txBody>
+          <a:bodyPr/>
+          <a:lstStyle/>
+          <a:p>
+            <a:pPr>
+              <a:defRPr/>
+            </a:pPr>
+            <a:fld id="{AE66C03C-4B0E-4149-8287-A3B340EB818D}" type="slidenum">
+              <a:rPr lang="en-US" altLang="en-US" smtClean="0"/>
+              <a:pPr>
+                <a:defRPr/>
+              </a:pPr>
+              <a:t>12</a:t>
+            </a:fld>
+            <a:endParaRPr lang="en-US" altLang="en-US"/>
+          </a:p>
+        </p:txBody>
+      </p:sp>
+    </p:spTree>
+    <p:extLst>
+      <p:ext uri="{BB962C8B-B14F-4D97-AF65-F5344CB8AC3E}">
+        <p14:creationId xmlns:p14="http://schemas.microsoft.com/office/powerpoint/2010/main" val="2204432888"/>
+      </p:ext>
+    </p:extLst>
+  </p:cSld>
+  <p:clrMapOvr>
+    <a:masterClrMapping/>
+  </p:clrMapOvr>
+</p:notes>
+</file>
+
+<file path=ppt/notesSlides/notesSlide13.xml><?xml version="1.0" encoding="utf-8"?>
+<p:notes xmlns:a="http://schemas.openxmlformats.org/drawingml/2006/main" xmlns:r="http://schemas.openxmlformats.org/officeDocument/2006/relationships" xmlns:p="http://schemas.openxmlformats.org/presentationml/2006/main">
+  <p:cSld>
+    <p:spTree>
+      <p:nvGrpSpPr>
+        <p:cNvPr id="1" name="">
+          <a:extLst>
+            <a:ext uri="{FF2B5EF4-FFF2-40B4-BE49-F238E27FC236}">
+              <a16:creationId xmlns:a16="http://schemas.microsoft.com/office/drawing/2014/main" id="{75CE641A-7CFA-B191-784B-875B6D967D1D}"/>
+            </a:ext>
+          </a:extLst>
+        </p:cNvPr>
+        <p:cNvGrpSpPr/>
+        <p:nvPr/>
+      </p:nvGrpSpPr>
+      <p:grpSpPr>
+        <a:xfrm>
+          <a:off x="0" y="0"/>
+          <a:ext cx="0" cy="0"/>
+          <a:chOff x="0" y="0"/>
+          <a:chExt cx="0" cy="0"/>
+        </a:xfrm>
+      </p:grpSpPr>
+      <p:sp>
+        <p:nvSpPr>
+          <p:cNvPr id="2" name="Slide Image Placeholder 1">
+            <a:extLst>
+              <a:ext uri="{FF2B5EF4-FFF2-40B4-BE49-F238E27FC236}">
+                <a16:creationId xmlns:a16="http://schemas.microsoft.com/office/drawing/2014/main" id="{C8482D16-F442-992D-B072-03CC81D1975E}"/>
+              </a:ext>
+            </a:extLst>
+          </p:cNvPr>
+          <p:cNvSpPr>
+            <a:spLocks noGrp="1" noRot="1" noChangeAspect="1"/>
+          </p:cNvSpPr>
+          <p:nvPr>
+            <p:ph type="sldImg"/>
+          </p:nvPr>
+        </p:nvSpPr>
+        <p:spPr/>
+      </p:sp>
+      <p:sp>
+        <p:nvSpPr>
+          <p:cNvPr id="3" name="Notes Placeholder 2">
+            <a:extLst>
+              <a:ext uri="{FF2B5EF4-FFF2-40B4-BE49-F238E27FC236}">
+                <a16:creationId xmlns:a16="http://schemas.microsoft.com/office/drawing/2014/main" id="{3C697811-7340-B718-184A-CBAE049460FA}"/>
+              </a:ext>
+            </a:extLst>
+          </p:cNvPr>
+          <p:cNvSpPr>
+            <a:spLocks noGrp="1"/>
+          </p:cNvSpPr>
+          <p:nvPr>
+            <p:ph type="body" idx="1"/>
+          </p:nvPr>
+        </p:nvSpPr>
+        <p:spPr/>
+        <p:txBody>
+          <a:bodyPr/>
+          <a:lstStyle/>
+          <a:p>
+            <a:endParaRPr lang="en-US" dirty="0"/>
+          </a:p>
+        </p:txBody>
+      </p:sp>
+      <p:sp>
+        <p:nvSpPr>
+          <p:cNvPr id="4" name="Slide Number Placeholder 3">
+            <a:extLst>
+              <a:ext uri="{FF2B5EF4-FFF2-40B4-BE49-F238E27FC236}">
+                <a16:creationId xmlns:a16="http://schemas.microsoft.com/office/drawing/2014/main" id="{4B426400-AC94-D1C8-E5B9-78CA5697033D}"/>
+              </a:ext>
+            </a:extLst>
+          </p:cNvPr>
+          <p:cNvSpPr>
+            <a:spLocks noGrp="1"/>
+          </p:cNvSpPr>
+          <p:nvPr>
+            <p:ph type="sldNum" sz="quarter" idx="5"/>
+          </p:nvPr>
+        </p:nvSpPr>
+        <p:spPr/>
+        <p:txBody>
+          <a:bodyPr/>
+          <a:lstStyle/>
+          <a:p>
+            <a:pPr>
+              <a:defRPr/>
+            </a:pPr>
+            <a:fld id="{AE66C03C-4B0E-4149-8287-A3B340EB818D}" type="slidenum">
+              <a:rPr lang="en-US" altLang="en-US" smtClean="0"/>
+              <a:pPr>
+                <a:defRPr/>
+              </a:pPr>
+              <a:t>13</a:t>
+            </a:fld>
+            <a:endParaRPr lang="en-US" altLang="en-US"/>
+          </a:p>
+        </p:txBody>
+      </p:sp>
+    </p:spTree>
+    <p:extLst>
+      <p:ext uri="{BB962C8B-B14F-4D97-AF65-F5344CB8AC3E}">
+        <p14:creationId xmlns:p14="http://schemas.microsoft.com/office/powerpoint/2010/main" val="636065264"/>
+      </p:ext>
+    </p:extLst>
+  </p:cSld>
+  <p:clrMapOvr>
+    <a:masterClrMapping/>
+  </p:clrMapOvr>
+</p:notes>
+</file>
+
+<file path=ppt/notesSlides/notesSlide14.xml><?xml version="1.0" encoding="utf-8"?>
+<p:notes xmlns:a="http://schemas.openxmlformats.org/drawingml/2006/main" xmlns:r="http://schemas.openxmlformats.org/officeDocument/2006/relationships" xmlns:p="http://schemas.openxmlformats.org/presentationml/2006/main">
+  <p:cSld>
+    <p:spTree>
+      <p:nvGrpSpPr>
+        <p:cNvPr id="1" name="">
+          <a:extLst>
+            <a:ext uri="{FF2B5EF4-FFF2-40B4-BE49-F238E27FC236}">
+              <a16:creationId xmlns:a16="http://schemas.microsoft.com/office/drawing/2014/main" id="{F365EECF-5571-B69D-EE7C-4C4B5D3500A7}"/>
+            </a:ext>
+          </a:extLst>
+        </p:cNvPr>
+        <p:cNvGrpSpPr/>
+        <p:nvPr/>
+      </p:nvGrpSpPr>
+      <p:grpSpPr>
+        <a:xfrm>
+          <a:off x="0" y="0"/>
+          <a:ext cx="0" cy="0"/>
+          <a:chOff x="0" y="0"/>
+          <a:chExt cx="0" cy="0"/>
+        </a:xfrm>
+      </p:grpSpPr>
+      <p:sp>
+        <p:nvSpPr>
+          <p:cNvPr id="2" name="Slide Image Placeholder 1">
+            <a:extLst>
+              <a:ext uri="{FF2B5EF4-FFF2-40B4-BE49-F238E27FC236}">
+                <a16:creationId xmlns:a16="http://schemas.microsoft.com/office/drawing/2014/main" id="{54E0D7DB-2D20-7818-2CA5-6D0AC8715050}"/>
+              </a:ext>
+            </a:extLst>
+          </p:cNvPr>
+          <p:cNvSpPr>
+            <a:spLocks noGrp="1" noRot="1" noChangeAspect="1"/>
+          </p:cNvSpPr>
+          <p:nvPr>
+            <p:ph type="sldImg"/>
+          </p:nvPr>
+        </p:nvSpPr>
+        <p:spPr/>
+      </p:sp>
+      <p:sp>
+        <p:nvSpPr>
+          <p:cNvPr id="3" name="Notes Placeholder 2">
+            <a:extLst>
+              <a:ext uri="{FF2B5EF4-FFF2-40B4-BE49-F238E27FC236}">
+                <a16:creationId xmlns:a16="http://schemas.microsoft.com/office/drawing/2014/main" id="{30D7619A-AD0C-1E03-E85A-9EDBD5550CFA}"/>
+              </a:ext>
+            </a:extLst>
+          </p:cNvPr>
+          <p:cNvSpPr>
+            <a:spLocks noGrp="1"/>
+          </p:cNvSpPr>
+          <p:nvPr>
+            <p:ph type="body" idx="1"/>
+          </p:nvPr>
+        </p:nvSpPr>
+        <p:spPr/>
+        <p:txBody>
+          <a:bodyPr/>
+          <a:lstStyle/>
+          <a:p>
+            <a:endParaRPr lang="en-US" dirty="0"/>
+          </a:p>
+        </p:txBody>
+      </p:sp>
+      <p:sp>
+        <p:nvSpPr>
+          <p:cNvPr id="4" name="Slide Number Placeholder 3">
+            <a:extLst>
+              <a:ext uri="{FF2B5EF4-FFF2-40B4-BE49-F238E27FC236}">
+                <a16:creationId xmlns:a16="http://schemas.microsoft.com/office/drawing/2014/main" id="{DE563BF3-2BBE-7587-E7E4-143EE38391DF}"/>
+              </a:ext>
+            </a:extLst>
+          </p:cNvPr>
+          <p:cNvSpPr>
+            <a:spLocks noGrp="1"/>
+          </p:cNvSpPr>
+          <p:nvPr>
+            <p:ph type="sldNum" sz="quarter" idx="5"/>
+          </p:nvPr>
+        </p:nvSpPr>
+        <p:spPr/>
+        <p:txBody>
+          <a:bodyPr/>
+          <a:lstStyle/>
+          <a:p>
+            <a:pPr>
+              <a:defRPr/>
+            </a:pPr>
+            <a:fld id="{AE66C03C-4B0E-4149-8287-A3B340EB818D}" type="slidenum">
+              <a:rPr lang="en-US" altLang="en-US" smtClean="0"/>
+              <a:pPr>
+                <a:defRPr/>
+              </a:pPr>
+              <a:t>14</a:t>
+            </a:fld>
+            <a:endParaRPr lang="en-US" altLang="en-US"/>
+          </a:p>
+        </p:txBody>
+      </p:sp>
+    </p:spTree>
+    <p:extLst>
+      <p:ext uri="{BB962C8B-B14F-4D97-AF65-F5344CB8AC3E}">
+        <p14:creationId xmlns:p14="http://schemas.microsoft.com/office/powerpoint/2010/main" val="2674347117"/>
+      </p:ext>
+    </p:extLst>
+  </p:cSld>
+  <p:clrMapOvr>
+    <a:masterClrMapping/>
+  </p:clrMapOvr>
+</p:notes>
+</file>
+
+<file path=ppt/notesSlides/notesSlide15.xml><?xml version="1.0" encoding="utf-8"?>
+<p:notes xmlns:a="http://schemas.openxmlformats.org/drawingml/2006/main" xmlns:r="http://schemas.openxmlformats.org/officeDocument/2006/relationships" xmlns:p="http://schemas.openxmlformats.org/presentationml/2006/main">
+  <p:cSld>
+    <p:spTree>
+      <p:nvGrpSpPr>
+        <p:cNvPr id="1" name="">
+          <a:extLst>
+            <a:ext uri="{FF2B5EF4-FFF2-40B4-BE49-F238E27FC236}">
+              <a16:creationId xmlns:a16="http://schemas.microsoft.com/office/drawing/2014/main" id="{B036A855-29D4-BC21-4609-7386FFBBD007}"/>
+            </a:ext>
+          </a:extLst>
+        </p:cNvPr>
+        <p:cNvGrpSpPr/>
+        <p:nvPr/>
+      </p:nvGrpSpPr>
+      <p:grpSpPr>
+        <a:xfrm>
+          <a:off x="0" y="0"/>
+          <a:ext cx="0" cy="0"/>
+          <a:chOff x="0" y="0"/>
+          <a:chExt cx="0" cy="0"/>
+        </a:xfrm>
+      </p:grpSpPr>
+      <p:sp>
+        <p:nvSpPr>
+          <p:cNvPr id="2" name="Slide Image Placeholder 1">
+            <a:extLst>
+              <a:ext uri="{FF2B5EF4-FFF2-40B4-BE49-F238E27FC236}">
+                <a16:creationId xmlns:a16="http://schemas.microsoft.com/office/drawing/2014/main" id="{0BDA479C-F9B0-5384-225D-6B8706C077ED}"/>
+              </a:ext>
+            </a:extLst>
+          </p:cNvPr>
+          <p:cNvSpPr>
+            <a:spLocks noGrp="1" noRot="1" noChangeAspect="1"/>
+          </p:cNvSpPr>
+          <p:nvPr>
+            <p:ph type="sldImg"/>
+          </p:nvPr>
+        </p:nvSpPr>
+        <p:spPr/>
+      </p:sp>
+      <p:sp>
+        <p:nvSpPr>
+          <p:cNvPr id="3" name="Notes Placeholder 2">
+            <a:extLst>
+              <a:ext uri="{FF2B5EF4-FFF2-40B4-BE49-F238E27FC236}">
+                <a16:creationId xmlns:a16="http://schemas.microsoft.com/office/drawing/2014/main" id="{D17DB02D-B14D-DB27-3127-7C3BCFD71181}"/>
+              </a:ext>
+            </a:extLst>
+          </p:cNvPr>
+          <p:cNvSpPr>
+            <a:spLocks noGrp="1"/>
+          </p:cNvSpPr>
+          <p:nvPr>
+            <p:ph type="body" idx="1"/>
+          </p:nvPr>
+        </p:nvSpPr>
+        <p:spPr/>
+        <p:txBody>
+          <a:bodyPr/>
+          <a:lstStyle/>
+          <a:p>
+            <a:endParaRPr lang="en-US" dirty="0"/>
+          </a:p>
+        </p:txBody>
+      </p:sp>
+      <p:sp>
+        <p:nvSpPr>
+          <p:cNvPr id="4" name="Slide Number Placeholder 3">
+            <a:extLst>
+              <a:ext uri="{FF2B5EF4-FFF2-40B4-BE49-F238E27FC236}">
+                <a16:creationId xmlns:a16="http://schemas.microsoft.com/office/drawing/2014/main" id="{3ECAB0F3-90D1-943D-FA3D-908AE9BF7A30}"/>
+              </a:ext>
+            </a:extLst>
+          </p:cNvPr>
+          <p:cNvSpPr>
+            <a:spLocks noGrp="1"/>
+          </p:cNvSpPr>
+          <p:nvPr>
+            <p:ph type="sldNum" sz="quarter" idx="5"/>
+          </p:nvPr>
+        </p:nvSpPr>
+        <p:spPr/>
+        <p:txBody>
+          <a:bodyPr/>
+          <a:lstStyle/>
+          <a:p>
+            <a:pPr>
+              <a:defRPr/>
+            </a:pPr>
+            <a:fld id="{AE66C03C-4B0E-4149-8287-A3B340EB818D}" type="slidenum">
+              <a:rPr lang="en-US" altLang="en-US" smtClean="0"/>
+              <a:pPr>
+                <a:defRPr/>
+              </a:pPr>
+              <a:t>15</a:t>
+            </a:fld>
+            <a:endParaRPr lang="en-US" altLang="en-US"/>
+          </a:p>
+        </p:txBody>
+      </p:sp>
+    </p:spTree>
+    <p:extLst>
+      <p:ext uri="{BB962C8B-B14F-4D97-AF65-F5344CB8AC3E}">
+        <p14:creationId xmlns:p14="http://schemas.microsoft.com/office/powerpoint/2010/main" val="1554662807"/>
+      </p:ext>
+    </p:extLst>
+  </p:cSld>
+  <p:clrMapOvr>
+    <a:masterClrMapping/>
+  </p:clrMapOvr>
+</p:notes>
+</file>
+
+<file path=ppt/notesSlides/notesSlide16.xml><?xml version="1.0" encoding="utf-8"?>
+<p:notes xmlns:a="http://schemas.openxmlformats.org/drawingml/2006/main" xmlns:r="http://schemas.openxmlformats.org/officeDocument/2006/relationships" xmlns:p="http://schemas.openxmlformats.org/presentationml/2006/main">
+  <p:cSld>
+    <p:spTree>
+      <p:nvGrpSpPr>
+        <p:cNvPr id="1" name=""/>
+        <p:cNvGrpSpPr/>
+        <p:nvPr/>
+      </p:nvGrpSpPr>
+      <p:grpSpPr>
+        <a:xfrm>
+          <a:off x="0" y="0"/>
+          <a:ext cx="0" cy="0"/>
+          <a:chOff x="0" y="0"/>
+          <a:chExt cx="0" cy="0"/>
+        </a:xfrm>
+      </p:grpSpPr>
+      <p:sp>
+        <p:nvSpPr>
+          <p:cNvPr id="2" name="Slide Image Placeholder 1"/>
+          <p:cNvSpPr>
+            <a:spLocks noGrp="1" noRot="1" noChangeAspect="1"/>
+          </p:cNvSpPr>
+          <p:nvPr>
+            <p:ph type="sldImg"/>
+          </p:nvPr>
+        </p:nvSpPr>
+        <p:spPr/>
+      </p:sp>
+      <p:sp>
+        <p:nvSpPr>
+          <p:cNvPr id="3" name="Notes Placeholder 2"/>
+          <p:cNvSpPr>
+            <a:spLocks noGrp="1"/>
+          </p:cNvSpPr>
+          <p:nvPr>
+            <p:ph type="body" idx="1"/>
+          </p:nvPr>
+        </p:nvSpPr>
+        <p:spPr/>
+        <p:txBody>
+          <a:bodyPr/>
+          <a:lstStyle/>
+          <a:p>
+            <a:endParaRPr lang="en-US" dirty="0"/>
+          </a:p>
+        </p:txBody>
+      </p:sp>
+      <p:sp>
+        <p:nvSpPr>
+          <p:cNvPr id="4" name="Slide Number Placeholder 3"/>
+          <p:cNvSpPr>
+            <a:spLocks noGrp="1"/>
+          </p:cNvSpPr>
+          <p:nvPr>
+            <p:ph type="sldNum" sz="quarter" idx="5"/>
+          </p:nvPr>
+        </p:nvSpPr>
+        <p:spPr/>
+        <p:txBody>
+          <a:bodyPr/>
+          <a:lstStyle/>
+          <a:p>
+            <a:pPr>
+              <a:defRPr/>
+            </a:pPr>
+            <a:fld id="{AE66C03C-4B0E-4149-8287-A3B340EB818D}" type="slidenum">
+              <a:rPr lang="en-US" altLang="en-US" smtClean="0"/>
+              <a:pPr>
+                <a:defRPr/>
+              </a:pPr>
+              <a:t>16</a:t>
+            </a:fld>
+            <a:endParaRPr lang="en-US" altLang="en-US"/>
+          </a:p>
+        </p:txBody>
+      </p:sp>
+    </p:spTree>
+    <p:extLst>
+      <p:ext uri="{BB962C8B-B14F-4D97-AF65-F5344CB8AC3E}">
+        <p14:creationId xmlns:p14="http://schemas.microsoft.com/office/powerpoint/2010/main" val="356406947"/>
+      </p:ext>
+    </p:extLst>
+  </p:cSld>
+  <p:clrMapOvr>
+    <a:masterClrMapping/>
+  </p:clrMapOvr>
+</p:notes>
+</file>
+
 <file path=ppt/notesSlides/notesSlide2.xml><?xml version="1.0" encoding="utf-8"?>
+<p:notes xmlns:a="http://schemas.openxmlformats.org/drawingml/2006/main" xmlns:r="http://schemas.openxmlformats.org/officeDocument/2006/relationships" xmlns:p="http://schemas.openxmlformats.org/presentationml/2006/main">
+  <p:cSld>
+    <p:spTree>
+      <p:nvGrpSpPr>
+        <p:cNvPr id="1" name="">
+          <a:extLst>
+            <a:ext uri="{FF2B5EF4-FFF2-40B4-BE49-F238E27FC236}">
+              <a16:creationId xmlns:a16="http://schemas.microsoft.com/office/drawing/2014/main" id="{168090C4-DA9C-3416-198B-EACA935775F9}"/>
+            </a:ext>
+          </a:extLst>
+        </p:cNvPr>
+        <p:cNvGrpSpPr/>
+        <p:nvPr/>
+      </p:nvGrpSpPr>
+      <p:grpSpPr>
+        <a:xfrm>
+          <a:off x="0" y="0"/>
+          <a:ext cx="0" cy="0"/>
+          <a:chOff x="0" y="0"/>
+          <a:chExt cx="0" cy="0"/>
+        </a:xfrm>
+      </p:grpSpPr>
+      <p:sp>
+        <p:nvSpPr>
+          <p:cNvPr id="2" name="Slide Image Placeholder 1">
+            <a:extLst>
+              <a:ext uri="{FF2B5EF4-FFF2-40B4-BE49-F238E27FC236}">
+                <a16:creationId xmlns:a16="http://schemas.microsoft.com/office/drawing/2014/main" id="{71668A91-B283-DC1E-ED85-E5F015FB428E}"/>
+              </a:ext>
+            </a:extLst>
+          </p:cNvPr>
+          <p:cNvSpPr>
+            <a:spLocks noGrp="1" noRot="1" noChangeAspect="1"/>
+          </p:cNvSpPr>
+          <p:nvPr>
+            <p:ph type="sldImg"/>
+          </p:nvPr>
+        </p:nvSpPr>
+        <p:spPr/>
+      </p:sp>
+      <p:sp>
+        <p:nvSpPr>
+          <p:cNvPr id="3" name="Notes Placeholder 2">
+            <a:extLst>
+              <a:ext uri="{FF2B5EF4-FFF2-40B4-BE49-F238E27FC236}">
+                <a16:creationId xmlns:a16="http://schemas.microsoft.com/office/drawing/2014/main" id="{07D2B2BB-F2A6-344F-7CC5-5162CC865243}"/>
+              </a:ext>
+            </a:extLst>
+          </p:cNvPr>
+          <p:cNvSpPr>
+            <a:spLocks noGrp="1"/>
+          </p:cNvSpPr>
+          <p:nvPr>
+            <p:ph type="body" idx="1"/>
+          </p:nvPr>
+        </p:nvSpPr>
+        <p:spPr/>
+        <p:txBody>
+          <a:bodyPr/>
+          <a:lstStyle/>
+          <a:p>
+            <a:r>
+              <a:rPr lang="en-US" dirty="0"/>
+              <a:t>Before we dive in, let’s quickly cover some housekeeping items. First, here’s our tutorial structure: we’ll start with any extra material you might need, then I’ll share a set of questions for you to work on, and finally, we’ll go through the answers and discuss any challenges you encountered.</a:t>
+            </a:r>
+          </a:p>
+          <a:p>
+            <a:r>
+              <a:rPr lang="en-US" dirty="0"/>
+              <a:t>You’ll also notice there’s a QR code on the top-left corner of the slide. If you scan it, you can access this slide directly, including the multiple pages of questions, so you can follow along at your own pace or refer back to them later. Feel free to scan it now or anytime during the session, as the QR code is always there.</a:t>
+            </a:r>
+          </a:p>
+        </p:txBody>
+      </p:sp>
+      <p:sp>
+        <p:nvSpPr>
+          <p:cNvPr id="4" name="Slide Number Placeholder 3">
+            <a:extLst>
+              <a:ext uri="{FF2B5EF4-FFF2-40B4-BE49-F238E27FC236}">
+                <a16:creationId xmlns:a16="http://schemas.microsoft.com/office/drawing/2014/main" id="{FCF8B67C-A989-040F-5E65-4C45BA2120F1}"/>
+              </a:ext>
+            </a:extLst>
+          </p:cNvPr>
+          <p:cNvSpPr>
+            <a:spLocks noGrp="1"/>
+          </p:cNvSpPr>
+          <p:nvPr>
+            <p:ph type="sldNum" sz="quarter" idx="5"/>
+          </p:nvPr>
+        </p:nvSpPr>
+        <p:spPr/>
+        <p:txBody>
+          <a:bodyPr/>
+          <a:lstStyle/>
+          <a:p>
+            <a:pPr>
+              <a:defRPr/>
+            </a:pPr>
+            <a:fld id="{AE66C03C-4B0E-4149-8287-A3B340EB818D}" type="slidenum">
+              <a:rPr lang="en-US" altLang="en-US" smtClean="0"/>
+              <a:pPr>
+                <a:defRPr/>
+              </a:pPr>
+              <a:t>2</a:t>
+            </a:fld>
+            <a:endParaRPr lang="en-US" altLang="en-US"/>
+          </a:p>
+        </p:txBody>
+      </p:sp>
+    </p:spTree>
+    <p:extLst>
+      <p:ext uri="{BB962C8B-B14F-4D97-AF65-F5344CB8AC3E}">
+        <p14:creationId xmlns:p14="http://schemas.microsoft.com/office/powerpoint/2010/main" val="121351254"/>
+      </p:ext>
+    </p:extLst>
+  </p:cSld>
+  <p:clrMapOvr>
+    <a:masterClrMapping/>
+  </p:clrMapOvr>
+</p:notes>
+</file>
+
+<file path=ppt/notesSlides/notesSlide3.xml><?xml version="1.0" encoding="utf-8"?>
 <p:notes xmlns:a="http://schemas.openxmlformats.org/drawingml/2006/main" xmlns:r="http://schemas.openxmlformats.org/officeDocument/2006/relationships" xmlns:p="http://schemas.openxmlformats.org/presentationml/2006/main">
   <p:cSld>
     <p:spTree>
@@ -1304,7 +2216,7 @@
               <a:pPr>
                 <a:defRPr/>
               </a:pPr>
-              <a:t>2</a:t>
+              <a:t>3</a:t>
             </a:fld>
             <a:endParaRPr lang="en-US" altLang="en-US"/>
           </a:p>
@@ -1323,7 +2235,7 @@
 </p:notes>
 </file>
 
-<file path=ppt/notesSlides/notesSlide3.xml><?xml version="1.0" encoding="utf-8"?>
+<file path=ppt/notesSlides/notesSlide4.xml><?xml version="1.0" encoding="utf-8"?>
 <p:notes xmlns:a="http://schemas.openxmlformats.org/drawingml/2006/main" xmlns:r="http://schemas.openxmlformats.org/officeDocument/2006/relationships" xmlns:p="http://schemas.openxmlformats.org/presentationml/2006/main">
   <p:cSld>
     <p:spTree>
@@ -1441,7 +2353,7 @@
               <a:pPr>
                 <a:defRPr/>
               </a:pPr>
-              <a:t>3</a:t>
+              <a:t>4</a:t>
             </a:fld>
             <a:endParaRPr lang="en-US" altLang="en-US"/>
           </a:p>
@@ -1460,7 +2372,7 @@
 </p:notes>
 </file>
 
-<file path=ppt/notesSlides/notesSlide4.xml><?xml version="1.0" encoding="utf-8"?>
+<file path=ppt/notesSlides/notesSlide5.xml><?xml version="1.0" encoding="utf-8"?>
 <p:notes xmlns:a="http://schemas.openxmlformats.org/drawingml/2006/main" xmlns:r="http://schemas.openxmlformats.org/officeDocument/2006/relationships" xmlns:p="http://schemas.openxmlformats.org/presentationml/2006/main">
   <p:cSld>
     <p:spTree>
@@ -1534,7 +2446,7 @@
               <a:pPr>
                 <a:defRPr/>
               </a:pPr>
-              <a:t>4</a:t>
+              <a:t>5</a:t>
             </a:fld>
             <a:endParaRPr lang="en-US" altLang="en-US"/>
           </a:p>
@@ -1553,7 +2465,7 @@
 </p:notes>
 </file>
 
-<file path=ppt/notesSlides/notesSlide5.xml><?xml version="1.0" encoding="utf-8"?>
+<file path=ppt/notesSlides/notesSlide6.xml><?xml version="1.0" encoding="utf-8"?>
 <p:notes xmlns:a="http://schemas.openxmlformats.org/drawingml/2006/main" xmlns:r="http://schemas.openxmlformats.org/officeDocument/2006/relationships" xmlns:p="http://schemas.openxmlformats.org/presentationml/2006/main">
   <p:cSld>
     <p:spTree>
@@ -1734,7 +2646,7 @@
               <a:pPr>
                 <a:defRPr/>
               </a:pPr>
-              <a:t>5</a:t>
+              <a:t>6</a:t>
             </a:fld>
             <a:endParaRPr lang="en-US" altLang="en-US"/>
           </a:p>
@@ -1753,7 +2665,7 @@
 </p:notes>
 </file>
 
-<file path=ppt/notesSlides/notesSlide6.xml><?xml version="1.0" encoding="utf-8"?>
+<file path=ppt/notesSlides/notesSlide7.xml><?xml version="1.0" encoding="utf-8"?>
 <p:notes xmlns:a="http://schemas.openxmlformats.org/drawingml/2006/main" xmlns:r="http://schemas.openxmlformats.org/officeDocument/2006/relationships" xmlns:p="http://schemas.openxmlformats.org/presentationml/2006/main">
   <p:cSld>
     <p:spTree>
@@ -1886,7 +2798,7 @@
               <a:pPr>
                 <a:defRPr/>
               </a:pPr>
-              <a:t>6</a:t>
+              <a:t>7</a:t>
             </a:fld>
             <a:endParaRPr lang="en-US" altLang="en-US"/>
           </a:p>
@@ -1905,7 +2817,7 @@
 </p:notes>
 </file>
 
-<file path=ppt/notesSlides/notesSlide7.xml><?xml version="1.0" encoding="utf-8"?>
+<file path=ppt/notesSlides/notesSlide8.xml><?xml version="1.0" encoding="utf-8"?>
 <p:notes xmlns:a="http://schemas.openxmlformats.org/drawingml/2006/main" xmlns:r="http://schemas.openxmlformats.org/officeDocument/2006/relationships" xmlns:p="http://schemas.openxmlformats.org/presentationml/2006/main">
   <p:cSld>
     <p:spTree>
@@ -2059,7 +2971,7 @@
               <a:pPr>
                 <a:defRPr/>
               </a:pPr>
-              <a:t>7</a:t>
+              <a:t>8</a:t>
             </a:fld>
             <a:endParaRPr lang="en-US" altLang="en-US"/>
           </a:p>
@@ -2078,7 +2990,7 @@
 </p:notes>
 </file>
 
-<file path=ppt/notesSlides/notesSlide8.xml><?xml version="1.0" encoding="utf-8"?>
+<file path=ppt/notesSlides/notesSlide9.xml><?xml version="1.0" encoding="utf-8"?>
 <p:notes xmlns:a="http://schemas.openxmlformats.org/drawingml/2006/main" xmlns:r="http://schemas.openxmlformats.org/officeDocument/2006/relationships" xmlns:p="http://schemas.openxmlformats.org/presentationml/2006/main">
   <p:cSld>
     <p:spTree>
@@ -2149,7 +3061,7 @@
               <a:pPr>
                 <a:defRPr/>
               </a:pPr>
-              <a:t>8</a:t>
+              <a:t>9</a:t>
             </a:fld>
             <a:endParaRPr lang="en-US" altLang="en-US"/>
           </a:p>
@@ -2158,7 +3070,7 @@
     </p:spTree>
     <p:extLst>
       <p:ext uri="{BB962C8B-B14F-4D97-AF65-F5344CB8AC3E}">
-        <p14:creationId xmlns:p14="http://schemas.microsoft.com/office/powerpoint/2010/main" val="356406947"/>
+        <p14:creationId xmlns:p14="http://schemas.microsoft.com/office/powerpoint/2010/main" val="4097259221"/>
       </p:ext>
     </p:extLst>
   </p:cSld>
@@ -5372,6 +6284,36 @@
           </a:p>
         </p:txBody>
       </p:sp>
+      <p:pic>
+        <p:nvPicPr>
+          <p:cNvPr id="4" name="Picture 3">
+            <a:extLst>
+              <a:ext uri="{FF2B5EF4-FFF2-40B4-BE49-F238E27FC236}">
+                <a16:creationId xmlns:a16="http://schemas.microsoft.com/office/drawing/2014/main" id="{035D5C4E-66F7-78D2-C06F-C372D104A01A}"/>
+              </a:ext>
+            </a:extLst>
+          </p:cNvPr>
+          <p:cNvPicPr>
+            <a:picLocks noChangeAspect="1"/>
+          </p:cNvPicPr>
+          <p:nvPr userDrawn="1"/>
+        </p:nvPicPr>
+        <p:blipFill>
+          <a:blip r:embed="rId15"/>
+          <a:stretch>
+            <a:fillRect/>
+          </a:stretch>
+        </p:blipFill>
+        <p:spPr>
+          <a:xfrm>
+            <a:off x="227012" y="203021"/>
+            <a:ext cx="1265358" cy="1265358"/>
+          </a:xfrm>
+          <a:prstGeom prst="rect">
+            <a:avLst/>
+          </a:prstGeom>
+        </p:spPr>
+      </p:pic>
     </p:spTree>
   </p:cSld>
   <p:clrMap bg1="lt1" tx1="dk1" bg2="lt2" tx2="dk2" accent1="accent1" accent2="accent2" accent3="accent3" accent4="accent4" accent5="accent5" accent6="accent6" hlink="hlink" folHlink="folHlink"/>
@@ -5921,7 +6863,2097 @@
 </p:sld>
 </file>
 
-<file path=ppt/slides/slide2.xml><?xml version="1.0" encoding="utf-8"?>
+<file path=ppt/slides/slide10.xml><?xml version="1.0" encoding="utf-8"?>
+<p:sld xmlns:a="http://schemas.openxmlformats.org/drawingml/2006/main" xmlns:r="http://schemas.openxmlformats.org/officeDocument/2006/relationships" xmlns:p="http://schemas.openxmlformats.org/presentationml/2006/main">
+  <p:cSld>
+    <p:spTree>
+      <p:nvGrpSpPr>
+        <p:cNvPr id="1" name="">
+          <a:extLst>
+            <a:ext uri="{FF2B5EF4-FFF2-40B4-BE49-F238E27FC236}">
+              <a16:creationId xmlns:a16="http://schemas.microsoft.com/office/drawing/2014/main" id="{5EAAAB49-468B-D70A-17B9-AD2DFDD87827}"/>
+            </a:ext>
+          </a:extLst>
+        </p:cNvPr>
+        <p:cNvGrpSpPr/>
+        <p:nvPr/>
+      </p:nvGrpSpPr>
+      <p:grpSpPr>
+        <a:xfrm>
+          <a:off x="0" y="0"/>
+          <a:ext cx="0" cy="0"/>
+          <a:chOff x="0" y="0"/>
+          <a:chExt cx="0" cy="0"/>
+        </a:xfrm>
+      </p:grpSpPr>
+      <p:sp>
+        <p:nvSpPr>
+          <p:cNvPr id="2" name="Title 1">
+            <a:extLst>
+              <a:ext uri="{FF2B5EF4-FFF2-40B4-BE49-F238E27FC236}">
+                <a16:creationId xmlns:a16="http://schemas.microsoft.com/office/drawing/2014/main" id="{5C6B5C67-834D-C9A7-90DE-649039F909B2}"/>
+              </a:ext>
+            </a:extLst>
+          </p:cNvPr>
+          <p:cNvSpPr>
+            <a:spLocks noGrp="1"/>
+          </p:cNvSpPr>
+          <p:nvPr>
+            <p:ph type="title"/>
+          </p:nvPr>
+        </p:nvSpPr>
+        <p:spPr/>
+        <p:txBody>
+          <a:bodyPr/>
+          <a:lstStyle/>
+          <a:p>
+            <a:pPr algn="ctr"/>
+            <a:r>
+              <a:rPr lang="en-NZ" sz="3600" dirty="0"/>
+              <a:t>Exercises</a:t>
+            </a:r>
+            <a:endParaRPr lang="en-US" sz="3600" dirty="0"/>
+          </a:p>
+        </p:txBody>
+      </p:sp>
+      <p:sp>
+        <p:nvSpPr>
+          <p:cNvPr id="3" name="Content Placeholder 2">
+            <a:extLst>
+              <a:ext uri="{FF2B5EF4-FFF2-40B4-BE49-F238E27FC236}">
+                <a16:creationId xmlns:a16="http://schemas.microsoft.com/office/drawing/2014/main" id="{3D3AAD9D-DE7B-D97E-E3D2-72E55A5A9F04}"/>
+              </a:ext>
+            </a:extLst>
+          </p:cNvPr>
+          <p:cNvSpPr>
+            <a:spLocks noGrp="1"/>
+          </p:cNvSpPr>
+          <p:nvPr>
+            <p:ph idx="1"/>
+          </p:nvPr>
+        </p:nvSpPr>
+        <p:spPr>
+          <a:xfrm>
+            <a:off x="837597" y="1881446"/>
+            <a:ext cx="7727518" cy="4903787"/>
+          </a:xfrm>
+        </p:spPr>
+        <p:txBody>
+          <a:bodyPr/>
+          <a:lstStyle/>
+          <a:p>
+            <a:pPr algn="l"/>
+            <a:r>
+              <a:rPr lang="en-US" sz="1800" b="0" i="1" u="none" strike="noStrike" baseline="0" dirty="0">
+                <a:latin typeface="+mj-lt"/>
+              </a:rPr>
+              <a:t>branch</a:t>
+            </a:r>
+            <a:r>
+              <a:rPr lang="en-US" sz="1800" b="0" i="0" u="none" strike="noStrike" baseline="0" dirty="0">
+                <a:latin typeface="+mj-lt"/>
+              </a:rPr>
+              <a:t>(</a:t>
+            </a:r>
+            <a:r>
+              <a:rPr lang="en-US" sz="1800" b="0" i="1" u="none" strike="noStrike" baseline="0" dirty="0">
+                <a:latin typeface="+mj-lt"/>
+              </a:rPr>
+              <a:t>branch name</a:t>
+            </a:r>
+            <a:r>
+              <a:rPr lang="en-US" sz="1800" b="0" i="0" u="none" strike="noStrike" baseline="0" dirty="0">
+                <a:latin typeface="+mj-lt"/>
+              </a:rPr>
+              <a:t>, </a:t>
+            </a:r>
+            <a:r>
+              <a:rPr lang="en-US" sz="1800" b="0" i="1" u="none" strike="noStrike" baseline="0" dirty="0">
+                <a:latin typeface="+mj-lt"/>
+              </a:rPr>
+              <a:t>branch city, assets</a:t>
+            </a:r>
+            <a:r>
+              <a:rPr lang="en-US" sz="1800" b="0" i="0" u="none" strike="noStrike" baseline="0" dirty="0">
+                <a:latin typeface="+mj-lt"/>
+              </a:rPr>
+              <a:t>)</a:t>
+            </a:r>
+          </a:p>
+          <a:p>
+            <a:pPr algn="l"/>
+            <a:r>
+              <a:rPr lang="en-US" sz="1800" b="0" i="1" u="none" strike="noStrike" baseline="0" dirty="0">
+                <a:latin typeface="+mj-lt"/>
+              </a:rPr>
+              <a:t>customer </a:t>
+            </a:r>
+            <a:r>
+              <a:rPr lang="en-US" sz="1800" b="0" i="0" u="none" strike="noStrike" baseline="0" dirty="0">
+                <a:latin typeface="+mj-lt"/>
+              </a:rPr>
+              <a:t>(</a:t>
+            </a:r>
+            <a:r>
+              <a:rPr lang="en-US" sz="1800" b="0" i="1" u="none" strike="noStrike" baseline="0" dirty="0">
+                <a:latin typeface="+mj-lt"/>
+              </a:rPr>
+              <a:t>ID</a:t>
+            </a:r>
+            <a:r>
+              <a:rPr lang="en-US" sz="1800" b="0" i="0" u="none" strike="noStrike" baseline="0" dirty="0">
+                <a:latin typeface="+mj-lt"/>
+              </a:rPr>
+              <a:t>, </a:t>
+            </a:r>
+            <a:r>
+              <a:rPr lang="en-US" sz="1800" b="0" i="1" u="none" strike="noStrike" baseline="0" dirty="0">
+                <a:latin typeface="+mj-lt"/>
+              </a:rPr>
+              <a:t>customer name</a:t>
+            </a:r>
+            <a:r>
+              <a:rPr lang="en-US" sz="1800" b="0" i="0" u="none" strike="noStrike" baseline="0" dirty="0">
+                <a:latin typeface="+mj-lt"/>
+              </a:rPr>
+              <a:t>, </a:t>
+            </a:r>
+            <a:r>
+              <a:rPr lang="en-US" sz="1800" b="0" i="1" u="none" strike="noStrike" baseline="0" dirty="0">
+                <a:latin typeface="+mj-lt"/>
+              </a:rPr>
+              <a:t>customer street, customer city</a:t>
+            </a:r>
+            <a:r>
+              <a:rPr lang="en-US" sz="1800" b="0" i="0" u="none" strike="noStrike" baseline="0" dirty="0">
+                <a:latin typeface="+mj-lt"/>
+              </a:rPr>
+              <a:t>)</a:t>
+            </a:r>
+          </a:p>
+          <a:p>
+            <a:pPr algn="l"/>
+            <a:r>
+              <a:rPr lang="en-US" sz="1800" b="0" i="1" u="none" strike="noStrike" baseline="0" dirty="0">
+                <a:latin typeface="+mj-lt"/>
+              </a:rPr>
+              <a:t>loan </a:t>
+            </a:r>
+            <a:r>
+              <a:rPr lang="en-US" sz="1800" b="0" i="0" u="none" strike="noStrike" baseline="0" dirty="0">
+                <a:latin typeface="+mj-lt"/>
+              </a:rPr>
+              <a:t>(</a:t>
+            </a:r>
+            <a:r>
+              <a:rPr lang="en-US" sz="1800" b="0" i="1" u="none" strike="noStrike" baseline="0" dirty="0">
+                <a:latin typeface="+mj-lt"/>
+              </a:rPr>
+              <a:t>loan number</a:t>
+            </a:r>
+            <a:r>
+              <a:rPr lang="en-US" sz="1800" b="0" i="0" u="none" strike="noStrike" baseline="0" dirty="0">
+                <a:latin typeface="+mj-lt"/>
+              </a:rPr>
+              <a:t>, </a:t>
+            </a:r>
+            <a:r>
+              <a:rPr lang="en-US" sz="1800" b="0" i="1" u="none" strike="noStrike" baseline="0" dirty="0">
+                <a:latin typeface="+mj-lt"/>
+              </a:rPr>
+              <a:t>branch name, amount</a:t>
+            </a:r>
+            <a:r>
+              <a:rPr lang="en-US" sz="1800" b="0" i="0" u="none" strike="noStrike" baseline="0" dirty="0">
+                <a:latin typeface="+mj-lt"/>
+              </a:rPr>
+              <a:t>)</a:t>
+            </a:r>
+          </a:p>
+          <a:p>
+            <a:pPr algn="l"/>
+            <a:r>
+              <a:rPr lang="en-US" sz="1800" b="0" i="1" u="none" strike="noStrike" baseline="0" dirty="0">
+                <a:latin typeface="+mj-lt"/>
+              </a:rPr>
+              <a:t>borrower </a:t>
+            </a:r>
+            <a:r>
+              <a:rPr lang="en-US" sz="1800" b="0" i="0" u="none" strike="noStrike" baseline="0" dirty="0">
+                <a:latin typeface="+mj-lt"/>
+              </a:rPr>
+              <a:t>(</a:t>
+            </a:r>
+            <a:r>
+              <a:rPr lang="en-US" sz="1800" b="0" i="1" u="none" strike="noStrike" baseline="0" dirty="0">
+                <a:latin typeface="+mj-lt"/>
+              </a:rPr>
+              <a:t>ID</a:t>
+            </a:r>
+            <a:r>
+              <a:rPr lang="en-US" sz="1800" b="0" i="0" u="none" strike="noStrike" baseline="0" dirty="0">
+                <a:latin typeface="+mj-lt"/>
+              </a:rPr>
+              <a:t>, </a:t>
+            </a:r>
+            <a:r>
+              <a:rPr lang="en-US" sz="1800" b="0" i="1" u="none" strike="noStrike" baseline="0" dirty="0">
+                <a:latin typeface="+mj-lt"/>
+              </a:rPr>
+              <a:t>loan number</a:t>
+            </a:r>
+            <a:r>
+              <a:rPr lang="en-US" sz="1800" b="0" i="0" u="none" strike="noStrike" baseline="0" dirty="0">
+                <a:latin typeface="+mj-lt"/>
+              </a:rPr>
+              <a:t>)</a:t>
+            </a:r>
+          </a:p>
+          <a:p>
+            <a:pPr algn="l"/>
+            <a:r>
+              <a:rPr lang="en-US" sz="1800" b="0" i="1" u="none" strike="noStrike" baseline="0" dirty="0">
+                <a:latin typeface="+mj-lt"/>
+              </a:rPr>
+              <a:t>account </a:t>
+            </a:r>
+            <a:r>
+              <a:rPr lang="en-US" sz="1800" b="0" i="0" u="none" strike="noStrike" baseline="0" dirty="0">
+                <a:latin typeface="+mj-lt"/>
+              </a:rPr>
+              <a:t>(</a:t>
+            </a:r>
+            <a:r>
+              <a:rPr lang="en-US" sz="1800" b="0" i="1" u="none" strike="noStrike" baseline="0" dirty="0">
+                <a:latin typeface="+mj-lt"/>
+              </a:rPr>
+              <a:t>account number</a:t>
+            </a:r>
+            <a:r>
+              <a:rPr lang="en-US" sz="1800" b="0" i="0" u="none" strike="noStrike" baseline="0" dirty="0">
+                <a:latin typeface="+mj-lt"/>
+              </a:rPr>
+              <a:t>, </a:t>
+            </a:r>
+            <a:r>
+              <a:rPr lang="en-US" sz="1800" b="0" i="1" u="none" strike="noStrike" baseline="0" dirty="0">
+                <a:latin typeface="+mj-lt"/>
+              </a:rPr>
+              <a:t>branch name, balance</a:t>
+            </a:r>
+            <a:r>
+              <a:rPr lang="en-US" sz="1800" b="0" i="0" u="none" strike="noStrike" baseline="0" dirty="0">
+                <a:latin typeface="+mj-lt"/>
+              </a:rPr>
+              <a:t>)</a:t>
+            </a:r>
+          </a:p>
+          <a:p>
+            <a:pPr algn="l"/>
+            <a:r>
+              <a:rPr lang="en-US" sz="1800" b="0" i="1" u="none" strike="noStrike" baseline="0" dirty="0">
+                <a:latin typeface="+mj-lt"/>
+              </a:rPr>
+              <a:t>depositor </a:t>
+            </a:r>
+            <a:r>
+              <a:rPr lang="en-US" sz="1800" b="0" i="0" u="none" strike="noStrike" baseline="0" dirty="0">
+                <a:latin typeface="+mj-lt"/>
+              </a:rPr>
+              <a:t>(</a:t>
+            </a:r>
+            <a:r>
+              <a:rPr lang="en-US" sz="1800" b="0" i="1" u="none" strike="noStrike" baseline="0" dirty="0">
+                <a:latin typeface="+mj-lt"/>
+              </a:rPr>
+              <a:t>ID</a:t>
+            </a:r>
+            <a:r>
+              <a:rPr lang="en-US" sz="1800" b="0" i="0" u="none" strike="noStrike" baseline="0" dirty="0">
+                <a:latin typeface="+mj-lt"/>
+              </a:rPr>
+              <a:t>, </a:t>
+            </a:r>
+            <a:r>
+              <a:rPr lang="en-US" sz="1800" b="0" i="1" u="none" strike="noStrike" baseline="0" dirty="0">
+                <a:latin typeface="+mj-lt"/>
+              </a:rPr>
+              <a:t>account number</a:t>
+            </a:r>
+            <a:r>
+              <a:rPr lang="en-US" sz="1800" b="0" i="0" u="none" strike="noStrike" baseline="0" dirty="0">
+                <a:latin typeface="+mj-lt"/>
+              </a:rPr>
+              <a:t>)</a:t>
+            </a:r>
+          </a:p>
+          <a:p>
+            <a:pPr marL="0" indent="0" algn="l">
+              <a:buNone/>
+            </a:pPr>
+            <a:endParaRPr lang="en-US" sz="1800" dirty="0">
+              <a:latin typeface="+mj-lt"/>
+            </a:endParaRPr>
+          </a:p>
+          <a:p>
+            <a:pPr marL="0" indent="0" algn="l">
+              <a:buNone/>
+            </a:pPr>
+            <a:r>
+              <a:rPr lang="en-US" sz="1800" b="0" i="0" u="none" strike="noStrike" baseline="0" dirty="0">
+                <a:latin typeface="+mj-lt"/>
+              </a:rPr>
+              <a:t>2. Consider this bank database. Give an expression in the relational algebra for each of the following:</a:t>
+            </a:r>
+          </a:p>
+          <a:p>
+            <a:r>
+              <a:rPr lang="en-US" sz="1800" b="0" i="0" u="none" strike="noStrike" baseline="0" dirty="0">
+                <a:latin typeface="+mj-lt"/>
+              </a:rPr>
+              <a:t>Find each loan number with a loan amount greater than $10000.</a:t>
+            </a:r>
+          </a:p>
+          <a:p>
+            <a:pPr algn="l"/>
+            <a:r>
+              <a:rPr lang="en-US" sz="1800" b="0" i="0" u="none" strike="noStrike" baseline="0" dirty="0">
+                <a:latin typeface="+mj-lt"/>
+              </a:rPr>
+              <a:t>Find the ID of each depositor who has an account with a balance greater than $6000.</a:t>
+            </a:r>
+          </a:p>
+          <a:p>
+            <a:pPr algn="l"/>
+            <a:r>
+              <a:rPr lang="en-US" sz="1800" b="0" i="0" u="none" strike="noStrike" baseline="0" dirty="0">
+                <a:latin typeface="+mj-lt"/>
+              </a:rPr>
+              <a:t>Find the ID of each depositor who has an account with a balance greater than $6000 at the “Uptown” branch.</a:t>
+            </a:r>
+            <a:endParaRPr lang="en-US" sz="2400" dirty="0">
+              <a:latin typeface="+mj-lt"/>
+            </a:endParaRPr>
+          </a:p>
+        </p:txBody>
+      </p:sp>
+      <p:sp>
+        <p:nvSpPr>
+          <p:cNvPr id="4" name="Slide Number Placeholder 3">
+            <a:extLst>
+              <a:ext uri="{FF2B5EF4-FFF2-40B4-BE49-F238E27FC236}">
+                <a16:creationId xmlns:a16="http://schemas.microsoft.com/office/drawing/2014/main" id="{0CC33197-F105-2EAD-EDA3-1535AD3F2F67}"/>
+              </a:ext>
+            </a:extLst>
+          </p:cNvPr>
+          <p:cNvSpPr>
+            <a:spLocks noGrp="1"/>
+          </p:cNvSpPr>
+          <p:nvPr>
+            <p:ph type="sldNum" sz="quarter" idx="10"/>
+          </p:nvPr>
+        </p:nvSpPr>
+        <p:spPr/>
+        <p:txBody>
+          <a:bodyPr/>
+          <a:lstStyle/>
+          <a:p>
+            <a:pPr>
+              <a:defRPr/>
+            </a:pPr>
+            <a:fld id="{547F3CAF-32BF-49A6-93F1-59C9E4B7C957}" type="slidenum">
+              <a:rPr lang="en-US" altLang="en-US" smtClean="0"/>
+              <a:pPr>
+                <a:defRPr/>
+              </a:pPr>
+              <a:t>10</a:t>
+            </a:fld>
+            <a:endParaRPr lang="en-US" altLang="en-US" dirty="0"/>
+          </a:p>
+        </p:txBody>
+      </p:sp>
+    </p:spTree>
+    <p:extLst>
+      <p:ext uri="{BB962C8B-B14F-4D97-AF65-F5344CB8AC3E}">
+        <p14:creationId xmlns:p14="http://schemas.microsoft.com/office/powerpoint/2010/main" val="464392404"/>
+      </p:ext>
+    </p:extLst>
+  </p:cSld>
+  <p:clrMapOvr>
+    <a:masterClrMapping/>
+  </p:clrMapOvr>
+</p:sld>
+</file>
+
+<file path=ppt/slides/slide11.xml><?xml version="1.0" encoding="utf-8"?>
+<p:sld xmlns:a="http://schemas.openxmlformats.org/drawingml/2006/main" xmlns:r="http://schemas.openxmlformats.org/officeDocument/2006/relationships" xmlns:p="http://schemas.openxmlformats.org/presentationml/2006/main">
+  <p:cSld>
+    <p:spTree>
+      <p:nvGrpSpPr>
+        <p:cNvPr id="1" name="">
+          <a:extLst>
+            <a:ext uri="{FF2B5EF4-FFF2-40B4-BE49-F238E27FC236}">
+              <a16:creationId xmlns:a16="http://schemas.microsoft.com/office/drawing/2014/main" id="{9785D2C4-F808-C6F2-00D9-7B80D864622A}"/>
+            </a:ext>
+          </a:extLst>
+        </p:cNvPr>
+        <p:cNvGrpSpPr/>
+        <p:nvPr/>
+      </p:nvGrpSpPr>
+      <p:grpSpPr>
+        <a:xfrm>
+          <a:off x="0" y="0"/>
+          <a:ext cx="0" cy="0"/>
+          <a:chOff x="0" y="0"/>
+          <a:chExt cx="0" cy="0"/>
+        </a:xfrm>
+      </p:grpSpPr>
+      <p:sp>
+        <p:nvSpPr>
+          <p:cNvPr id="2" name="Title 1">
+            <a:extLst>
+              <a:ext uri="{FF2B5EF4-FFF2-40B4-BE49-F238E27FC236}">
+                <a16:creationId xmlns:a16="http://schemas.microsoft.com/office/drawing/2014/main" id="{37BE28C0-92B1-3527-0C5B-A3473000B89B}"/>
+              </a:ext>
+            </a:extLst>
+          </p:cNvPr>
+          <p:cNvSpPr>
+            <a:spLocks noGrp="1"/>
+          </p:cNvSpPr>
+          <p:nvPr>
+            <p:ph type="title"/>
+          </p:nvPr>
+        </p:nvSpPr>
+        <p:spPr/>
+        <p:txBody>
+          <a:bodyPr/>
+          <a:lstStyle/>
+          <a:p>
+            <a:pPr algn="ctr"/>
+            <a:r>
+              <a:rPr lang="en-NZ" sz="3600" dirty="0"/>
+              <a:t>Exercises</a:t>
+            </a:r>
+            <a:endParaRPr lang="en-US" sz="3600" dirty="0"/>
+          </a:p>
+        </p:txBody>
+      </p:sp>
+      <p:sp>
+        <p:nvSpPr>
+          <p:cNvPr id="3" name="Content Placeholder 2">
+            <a:extLst>
+              <a:ext uri="{FF2B5EF4-FFF2-40B4-BE49-F238E27FC236}">
+                <a16:creationId xmlns:a16="http://schemas.microsoft.com/office/drawing/2014/main" id="{6170B6C3-2A6B-2622-20DA-F1BB85CC313C}"/>
+              </a:ext>
+            </a:extLst>
+          </p:cNvPr>
+          <p:cNvSpPr>
+            <a:spLocks noGrp="1"/>
+          </p:cNvSpPr>
+          <p:nvPr>
+            <p:ph idx="1"/>
+          </p:nvPr>
+        </p:nvSpPr>
+        <p:spPr>
+          <a:xfrm>
+            <a:off x="837597" y="1881446"/>
+            <a:ext cx="7727518" cy="4903787"/>
+          </a:xfrm>
+        </p:spPr>
+        <p:txBody>
+          <a:bodyPr/>
+          <a:lstStyle/>
+          <a:p>
+            <a:pPr marL="0" indent="0" algn="l">
+              <a:buNone/>
+            </a:pPr>
+            <a:r>
+              <a:rPr lang="en-US" sz="1800" b="0" i="0" u="none" strike="noStrike" baseline="0" dirty="0">
+                <a:latin typeface="+mj-lt"/>
+              </a:rPr>
+              <a:t>3. Consider the university database (see Appendix).</a:t>
+            </a:r>
+          </a:p>
+          <a:p>
+            <a:pPr marL="0" indent="0">
+              <a:buNone/>
+            </a:pPr>
+            <a:r>
+              <a:rPr lang="en-US" sz="1800" dirty="0"/>
+              <a:t>Write the following queries in relational algebra:</a:t>
+            </a:r>
+          </a:p>
+          <a:p>
+            <a:pPr>
+              <a:buFont typeface="Arial" panose="020B0604020202020204" pitchFamily="34" charset="0"/>
+              <a:buChar char="•"/>
+            </a:pPr>
+            <a:r>
+              <a:rPr lang="en-US" sz="1800" dirty="0"/>
+              <a:t>Find the ID and name of each instructor in the Physics department.</a:t>
+            </a:r>
+          </a:p>
+          <a:p>
+            <a:pPr>
+              <a:buFont typeface="Arial" panose="020B0604020202020204" pitchFamily="34" charset="0"/>
+              <a:buChar char="•"/>
+            </a:pPr>
+            <a:r>
+              <a:rPr lang="en-US" sz="1800" dirty="0"/>
+              <a:t>Find the ID and name of each instructor in a department located in the building “Watson”.</a:t>
+            </a:r>
+          </a:p>
+          <a:p>
+            <a:pPr>
+              <a:buFont typeface="Arial" panose="020B0604020202020204" pitchFamily="34" charset="0"/>
+              <a:buChar char="•"/>
+            </a:pPr>
+            <a:r>
+              <a:rPr lang="en-US" sz="1800" dirty="0"/>
+              <a:t>Find the ID and name of each student who has taken at least one course in the “Comp. Sci.” department.</a:t>
+            </a:r>
+          </a:p>
+          <a:p>
+            <a:pPr>
+              <a:buFont typeface="Arial" panose="020B0604020202020204" pitchFamily="34" charset="0"/>
+              <a:buChar char="•"/>
+            </a:pPr>
+            <a:r>
+              <a:rPr lang="en-US" sz="1800" dirty="0"/>
+              <a:t>Find the ID and name of each student who has taken at least one course section in the year 2018.</a:t>
+            </a:r>
+          </a:p>
+          <a:p>
+            <a:pPr>
+              <a:buFont typeface="Arial" panose="020B0604020202020204" pitchFamily="34" charset="0"/>
+              <a:buChar char="•"/>
+            </a:pPr>
+            <a:r>
+              <a:rPr lang="en-US" sz="1800" dirty="0"/>
+              <a:t>Find the ID and name of each student who has not taken any course section in the year 2018.</a:t>
+            </a:r>
+          </a:p>
+        </p:txBody>
+      </p:sp>
+      <p:sp>
+        <p:nvSpPr>
+          <p:cNvPr id="4" name="Slide Number Placeholder 3">
+            <a:extLst>
+              <a:ext uri="{FF2B5EF4-FFF2-40B4-BE49-F238E27FC236}">
+                <a16:creationId xmlns:a16="http://schemas.microsoft.com/office/drawing/2014/main" id="{EB8AE2FC-A2A0-BCFD-23B9-284E0C791425}"/>
+              </a:ext>
+            </a:extLst>
+          </p:cNvPr>
+          <p:cNvSpPr>
+            <a:spLocks noGrp="1"/>
+          </p:cNvSpPr>
+          <p:nvPr>
+            <p:ph type="sldNum" sz="quarter" idx="10"/>
+          </p:nvPr>
+        </p:nvSpPr>
+        <p:spPr/>
+        <p:txBody>
+          <a:bodyPr/>
+          <a:lstStyle/>
+          <a:p>
+            <a:pPr>
+              <a:defRPr/>
+            </a:pPr>
+            <a:fld id="{547F3CAF-32BF-49A6-93F1-59C9E4B7C957}" type="slidenum">
+              <a:rPr lang="en-US" altLang="en-US" smtClean="0"/>
+              <a:pPr>
+                <a:defRPr/>
+              </a:pPr>
+              <a:t>11</a:t>
+            </a:fld>
+            <a:endParaRPr lang="en-US" altLang="en-US" dirty="0"/>
+          </a:p>
+        </p:txBody>
+      </p:sp>
+    </p:spTree>
+    <p:extLst>
+      <p:ext uri="{BB962C8B-B14F-4D97-AF65-F5344CB8AC3E}">
+        <p14:creationId xmlns:p14="http://schemas.microsoft.com/office/powerpoint/2010/main" val="2953421902"/>
+      </p:ext>
+    </p:extLst>
+  </p:cSld>
+  <p:clrMapOvr>
+    <a:masterClrMapping/>
+  </p:clrMapOvr>
+</p:sld>
+</file>
+
+<file path=ppt/slides/slide12.xml><?xml version="1.0" encoding="utf-8"?>
+<p:sld xmlns:a="http://schemas.openxmlformats.org/drawingml/2006/main" xmlns:r="http://schemas.openxmlformats.org/officeDocument/2006/relationships" xmlns:p="http://schemas.openxmlformats.org/presentationml/2006/main">
+  <p:cSld>
+    <p:spTree>
+      <p:nvGrpSpPr>
+        <p:cNvPr id="1" name="">
+          <a:extLst>
+            <a:ext uri="{FF2B5EF4-FFF2-40B4-BE49-F238E27FC236}">
+              <a16:creationId xmlns:a16="http://schemas.microsoft.com/office/drawing/2014/main" id="{33D551A4-9831-8BFF-6BE1-F2D6EFA43C91}"/>
+            </a:ext>
+          </a:extLst>
+        </p:cNvPr>
+        <p:cNvGrpSpPr/>
+        <p:nvPr/>
+      </p:nvGrpSpPr>
+      <p:grpSpPr>
+        <a:xfrm>
+          <a:off x="0" y="0"/>
+          <a:ext cx="0" cy="0"/>
+          <a:chOff x="0" y="0"/>
+          <a:chExt cx="0" cy="0"/>
+        </a:xfrm>
+      </p:grpSpPr>
+      <p:sp>
+        <p:nvSpPr>
+          <p:cNvPr id="2" name="Title 1">
+            <a:extLst>
+              <a:ext uri="{FF2B5EF4-FFF2-40B4-BE49-F238E27FC236}">
+                <a16:creationId xmlns:a16="http://schemas.microsoft.com/office/drawing/2014/main" id="{4C198615-9289-FE8F-FF7A-D057829C4E8C}"/>
+              </a:ext>
+            </a:extLst>
+          </p:cNvPr>
+          <p:cNvSpPr>
+            <a:spLocks noGrp="1"/>
+          </p:cNvSpPr>
+          <p:nvPr>
+            <p:ph type="title"/>
+          </p:nvPr>
+        </p:nvSpPr>
+        <p:spPr/>
+        <p:txBody>
+          <a:bodyPr/>
+          <a:lstStyle/>
+          <a:p>
+            <a:pPr algn="ctr"/>
+            <a:r>
+              <a:rPr lang="en-NZ" sz="3600" dirty="0"/>
+              <a:t>Exercises</a:t>
+            </a:r>
+            <a:endParaRPr lang="en-US" sz="3600" dirty="0"/>
+          </a:p>
+        </p:txBody>
+      </p:sp>
+      <p:sp>
+        <p:nvSpPr>
+          <p:cNvPr id="3" name="Content Placeholder 2">
+            <a:extLst>
+              <a:ext uri="{FF2B5EF4-FFF2-40B4-BE49-F238E27FC236}">
+                <a16:creationId xmlns:a16="http://schemas.microsoft.com/office/drawing/2014/main" id="{C396D18D-B6FC-B631-42B1-5DD96791A63A}"/>
+              </a:ext>
+            </a:extLst>
+          </p:cNvPr>
+          <p:cNvSpPr>
+            <a:spLocks noGrp="1"/>
+          </p:cNvSpPr>
+          <p:nvPr>
+            <p:ph idx="1"/>
+          </p:nvPr>
+        </p:nvSpPr>
+        <p:spPr>
+          <a:xfrm>
+            <a:off x="837597" y="1881446"/>
+            <a:ext cx="7727518" cy="4903787"/>
+          </a:xfrm>
+        </p:spPr>
+        <p:txBody>
+          <a:bodyPr/>
+          <a:lstStyle/>
+          <a:p>
+            <a:pPr marL="0" indent="0" algn="l">
+              <a:buNone/>
+            </a:pPr>
+            <a:r>
+              <a:rPr lang="en-US" sz="1800" b="0" i="0" u="none" strike="noStrike" baseline="0" dirty="0">
+                <a:latin typeface="+mj-lt"/>
+              </a:rPr>
+              <a:t>4. Write the following queries in SQL, using the university schema:</a:t>
+            </a:r>
+          </a:p>
+          <a:p>
+            <a:pPr>
+              <a:buFont typeface="Arial" panose="020B0604020202020204" pitchFamily="34" charset="0"/>
+              <a:buChar char="•"/>
+            </a:pPr>
+            <a:r>
+              <a:rPr lang="en-US" sz="1800" dirty="0"/>
+              <a:t>Find the titles of courses in the Comp. Sci. department that have 3 credits.</a:t>
+            </a:r>
+          </a:p>
+          <a:p>
+            <a:pPr>
+              <a:buFont typeface="Arial" panose="020B0604020202020204" pitchFamily="34" charset="0"/>
+              <a:buChar char="•"/>
+            </a:pPr>
+            <a:r>
+              <a:rPr lang="en-US" sz="1800" dirty="0"/>
+              <a:t>Find the IDs of all students who were taught by an instructor named Einstein; make sure there are no duplicates in the result.</a:t>
+            </a:r>
+          </a:p>
+          <a:p>
+            <a:pPr>
+              <a:buFont typeface="Arial" panose="020B0604020202020204" pitchFamily="34" charset="0"/>
+              <a:buChar char="•"/>
+            </a:pPr>
+            <a:r>
+              <a:rPr lang="en-US" sz="1800" dirty="0"/>
+              <a:t>Find the highest salary of any instructor.</a:t>
+            </a:r>
+          </a:p>
+          <a:p>
+            <a:pPr>
+              <a:buFont typeface="Arial" panose="020B0604020202020204" pitchFamily="34" charset="0"/>
+              <a:buChar char="•"/>
+            </a:pPr>
+            <a:r>
+              <a:rPr lang="en-US" sz="1800" dirty="0"/>
+              <a:t>Find all instructors earning the highest salary (there may be more than one with the same salary).</a:t>
+            </a:r>
+          </a:p>
+          <a:p>
+            <a:pPr>
+              <a:buFont typeface="Arial" panose="020B0604020202020204" pitchFamily="34" charset="0"/>
+              <a:buChar char="•"/>
+            </a:pPr>
+            <a:r>
+              <a:rPr lang="en-US" sz="1800" dirty="0"/>
+              <a:t>Find the enrollment of each section that was offered in Fall 2017.</a:t>
+            </a:r>
+          </a:p>
+          <a:p>
+            <a:pPr>
+              <a:buFont typeface="Arial" panose="020B0604020202020204" pitchFamily="34" charset="0"/>
+              <a:buChar char="•"/>
+            </a:pPr>
+            <a:r>
+              <a:rPr lang="en-US" sz="1800" dirty="0"/>
+              <a:t>Find the maximum enrollment, across all sections, in Fall 2017.</a:t>
+            </a:r>
+          </a:p>
+          <a:p>
+            <a:pPr>
+              <a:buFont typeface="Arial" panose="020B0604020202020204" pitchFamily="34" charset="0"/>
+              <a:buChar char="•"/>
+            </a:pPr>
+            <a:r>
+              <a:rPr lang="en-US" sz="1800" dirty="0"/>
+              <a:t>Find the sections that had the maximum enrollment in Fall 2017.</a:t>
+            </a:r>
+          </a:p>
+          <a:p>
+            <a:pPr marL="0" indent="0">
+              <a:buNone/>
+            </a:pPr>
+            <a:endParaRPr lang="en-US" sz="1800" dirty="0"/>
+          </a:p>
+          <a:p>
+            <a:pPr marL="0" indent="0">
+              <a:buNone/>
+            </a:pPr>
+            <a:endParaRPr lang="en-US" sz="1800" dirty="0"/>
+          </a:p>
+        </p:txBody>
+      </p:sp>
+      <p:sp>
+        <p:nvSpPr>
+          <p:cNvPr id="4" name="Slide Number Placeholder 3">
+            <a:extLst>
+              <a:ext uri="{FF2B5EF4-FFF2-40B4-BE49-F238E27FC236}">
+                <a16:creationId xmlns:a16="http://schemas.microsoft.com/office/drawing/2014/main" id="{4843A3EA-9B19-4620-3733-001EA12D2380}"/>
+              </a:ext>
+            </a:extLst>
+          </p:cNvPr>
+          <p:cNvSpPr>
+            <a:spLocks noGrp="1"/>
+          </p:cNvSpPr>
+          <p:nvPr>
+            <p:ph type="sldNum" sz="quarter" idx="10"/>
+          </p:nvPr>
+        </p:nvSpPr>
+        <p:spPr/>
+        <p:txBody>
+          <a:bodyPr/>
+          <a:lstStyle/>
+          <a:p>
+            <a:pPr>
+              <a:defRPr/>
+            </a:pPr>
+            <a:fld id="{547F3CAF-32BF-49A6-93F1-59C9E4B7C957}" type="slidenum">
+              <a:rPr lang="en-US" altLang="en-US" smtClean="0"/>
+              <a:pPr>
+                <a:defRPr/>
+              </a:pPr>
+              <a:t>12</a:t>
+            </a:fld>
+            <a:endParaRPr lang="en-US" altLang="en-US" dirty="0"/>
+          </a:p>
+        </p:txBody>
+      </p:sp>
+    </p:spTree>
+    <p:extLst>
+      <p:ext uri="{BB962C8B-B14F-4D97-AF65-F5344CB8AC3E}">
+        <p14:creationId xmlns:p14="http://schemas.microsoft.com/office/powerpoint/2010/main" val="1202693325"/>
+      </p:ext>
+    </p:extLst>
+  </p:cSld>
+  <p:clrMapOvr>
+    <a:masterClrMapping/>
+  </p:clrMapOvr>
+</p:sld>
+</file>
+
+<file path=ppt/slides/slide13.xml><?xml version="1.0" encoding="utf-8"?>
+<p:sld xmlns:a="http://schemas.openxmlformats.org/drawingml/2006/main" xmlns:r="http://schemas.openxmlformats.org/officeDocument/2006/relationships" xmlns:p="http://schemas.openxmlformats.org/presentationml/2006/main">
+  <p:cSld>
+    <p:spTree>
+      <p:nvGrpSpPr>
+        <p:cNvPr id="1" name="">
+          <a:extLst>
+            <a:ext uri="{FF2B5EF4-FFF2-40B4-BE49-F238E27FC236}">
+              <a16:creationId xmlns:a16="http://schemas.microsoft.com/office/drawing/2014/main" id="{F9FD0D41-C0E8-CE51-188D-7788D6649C96}"/>
+            </a:ext>
+          </a:extLst>
+        </p:cNvPr>
+        <p:cNvGrpSpPr/>
+        <p:nvPr/>
+      </p:nvGrpSpPr>
+      <p:grpSpPr>
+        <a:xfrm>
+          <a:off x="0" y="0"/>
+          <a:ext cx="0" cy="0"/>
+          <a:chOff x="0" y="0"/>
+          <a:chExt cx="0" cy="0"/>
+        </a:xfrm>
+      </p:grpSpPr>
+      <p:sp>
+        <p:nvSpPr>
+          <p:cNvPr id="2" name="Title 1">
+            <a:extLst>
+              <a:ext uri="{FF2B5EF4-FFF2-40B4-BE49-F238E27FC236}">
+                <a16:creationId xmlns:a16="http://schemas.microsoft.com/office/drawing/2014/main" id="{9AED3A3E-6B2E-3618-5BB2-75789694C0C8}"/>
+              </a:ext>
+            </a:extLst>
+          </p:cNvPr>
+          <p:cNvSpPr>
+            <a:spLocks noGrp="1"/>
+          </p:cNvSpPr>
+          <p:nvPr>
+            <p:ph type="title"/>
+          </p:nvPr>
+        </p:nvSpPr>
+        <p:spPr/>
+        <p:txBody>
+          <a:bodyPr/>
+          <a:lstStyle/>
+          <a:p>
+            <a:pPr algn="ctr"/>
+            <a:r>
+              <a:rPr lang="en-NZ" sz="3600" dirty="0"/>
+              <a:t>Appendix:</a:t>
+            </a:r>
+            <a:br>
+              <a:rPr lang="en-NZ" sz="3600" dirty="0"/>
+            </a:br>
+            <a:r>
+              <a:rPr lang="en-NZ" sz="3600" dirty="0"/>
+              <a:t>University Database</a:t>
+            </a:r>
+            <a:endParaRPr lang="en-US" sz="3600" dirty="0"/>
+          </a:p>
+        </p:txBody>
+      </p:sp>
+      <p:sp>
+        <p:nvSpPr>
+          <p:cNvPr id="3" name="Content Placeholder 2">
+            <a:extLst>
+              <a:ext uri="{FF2B5EF4-FFF2-40B4-BE49-F238E27FC236}">
+                <a16:creationId xmlns:a16="http://schemas.microsoft.com/office/drawing/2014/main" id="{E1958758-CACA-8D94-5128-663121513A14}"/>
+              </a:ext>
+            </a:extLst>
+          </p:cNvPr>
+          <p:cNvSpPr>
+            <a:spLocks noGrp="1"/>
+          </p:cNvSpPr>
+          <p:nvPr>
+            <p:ph idx="1"/>
+          </p:nvPr>
+        </p:nvSpPr>
+        <p:spPr>
+          <a:xfrm>
+            <a:off x="837597" y="1881446"/>
+            <a:ext cx="7727518" cy="4903787"/>
+          </a:xfrm>
+        </p:spPr>
+        <p:txBody>
+          <a:bodyPr/>
+          <a:lstStyle/>
+          <a:p>
+            <a:pPr marL="0" indent="0" algn="l">
+              <a:buNone/>
+            </a:pPr>
+            <a:r>
+              <a:rPr lang="en-US" sz="1800" b="0" i="1" u="none" strike="noStrike" baseline="0" dirty="0">
+                <a:latin typeface="+mj-lt"/>
+              </a:rPr>
+              <a:t>classroom</a:t>
+            </a:r>
+            <a:r>
+              <a:rPr lang="en-US" sz="1800" b="0" i="0" u="none" strike="noStrike" baseline="0" dirty="0">
+                <a:latin typeface="+mj-lt"/>
+              </a:rPr>
+              <a:t>(</a:t>
+            </a:r>
+            <a:r>
+              <a:rPr lang="en-US" sz="1800" b="0" i="1" u="none" strike="noStrike" baseline="0" dirty="0">
+                <a:latin typeface="+mj-lt"/>
+              </a:rPr>
+              <a:t>building</a:t>
+            </a:r>
+            <a:r>
+              <a:rPr lang="en-US" sz="1800" b="0" i="0" u="none" strike="noStrike" baseline="0" dirty="0">
+                <a:latin typeface="+mj-lt"/>
+              </a:rPr>
+              <a:t>, </a:t>
+            </a:r>
+            <a:r>
+              <a:rPr lang="en-US" sz="1800" b="0" i="1" u="none" strike="noStrike" baseline="0" dirty="0">
+                <a:latin typeface="+mj-lt"/>
+              </a:rPr>
+              <a:t>room number</a:t>
+            </a:r>
+            <a:r>
+              <a:rPr lang="en-US" sz="1800" b="0" i="0" u="none" strike="noStrike" baseline="0" dirty="0">
+                <a:latin typeface="+mj-lt"/>
+              </a:rPr>
+              <a:t>, </a:t>
+            </a:r>
+            <a:r>
+              <a:rPr lang="en-US" sz="1800" b="0" i="1" u="none" strike="noStrike" baseline="0" dirty="0">
+                <a:latin typeface="+mj-lt"/>
+              </a:rPr>
+              <a:t>capacity</a:t>
+            </a:r>
+            <a:r>
+              <a:rPr lang="en-US" sz="1800" b="0" i="0" u="none" strike="noStrike" baseline="0" dirty="0">
+                <a:latin typeface="+mj-lt"/>
+              </a:rPr>
+              <a:t>)</a:t>
+            </a:r>
+          </a:p>
+          <a:p>
+            <a:pPr marL="0" indent="0" algn="l">
+              <a:buNone/>
+            </a:pPr>
+            <a:r>
+              <a:rPr lang="en-US" sz="1800" b="0" i="1" u="none" strike="noStrike" baseline="0" dirty="0">
+                <a:latin typeface="+mj-lt"/>
+              </a:rPr>
+              <a:t>department</a:t>
+            </a:r>
+            <a:r>
+              <a:rPr lang="en-US" sz="1800" b="0" i="0" u="none" strike="noStrike" baseline="0" dirty="0">
+                <a:latin typeface="+mj-lt"/>
+              </a:rPr>
+              <a:t>(</a:t>
+            </a:r>
+            <a:r>
+              <a:rPr lang="en-US" sz="1800" b="0" i="1" u="none" strike="noStrike" baseline="0" dirty="0" err="1">
+                <a:latin typeface="+mj-lt"/>
+              </a:rPr>
+              <a:t>dept_name</a:t>
+            </a:r>
+            <a:r>
+              <a:rPr lang="en-US" sz="1800" b="0" i="0" u="none" strike="noStrike" baseline="0" dirty="0">
+                <a:latin typeface="+mj-lt"/>
+              </a:rPr>
+              <a:t>, </a:t>
+            </a:r>
+            <a:r>
+              <a:rPr lang="en-US" sz="1800" b="0" i="1" u="none" strike="noStrike" baseline="0" dirty="0">
+                <a:latin typeface="+mj-lt"/>
+              </a:rPr>
+              <a:t>building</a:t>
+            </a:r>
+            <a:r>
+              <a:rPr lang="en-US" sz="1800" b="0" i="0" u="none" strike="noStrike" baseline="0" dirty="0">
+                <a:latin typeface="+mj-lt"/>
+              </a:rPr>
+              <a:t>, </a:t>
+            </a:r>
+            <a:r>
+              <a:rPr lang="en-US" sz="1800" b="0" i="1" u="none" strike="noStrike" baseline="0" dirty="0">
+                <a:latin typeface="+mj-lt"/>
+              </a:rPr>
+              <a:t>budget</a:t>
+            </a:r>
+            <a:r>
+              <a:rPr lang="en-US" sz="1800" b="0" i="0" u="none" strike="noStrike" baseline="0" dirty="0">
+                <a:latin typeface="+mj-lt"/>
+              </a:rPr>
+              <a:t>)</a:t>
+            </a:r>
+          </a:p>
+          <a:p>
+            <a:pPr marL="0" indent="0" algn="l">
+              <a:buNone/>
+            </a:pPr>
+            <a:r>
+              <a:rPr lang="en-US" sz="1800" b="0" i="1" u="none" strike="noStrike" baseline="0" dirty="0">
+                <a:latin typeface="+mj-lt"/>
+              </a:rPr>
+              <a:t>course</a:t>
+            </a:r>
+            <a:r>
+              <a:rPr lang="en-US" sz="1800" b="0" i="0" u="none" strike="noStrike" baseline="0" dirty="0">
+                <a:latin typeface="+mj-lt"/>
+              </a:rPr>
+              <a:t>(</a:t>
+            </a:r>
+            <a:r>
+              <a:rPr lang="en-US" sz="1800" b="0" i="1" u="none" strike="noStrike" baseline="0" dirty="0" err="1">
+                <a:latin typeface="+mj-lt"/>
+              </a:rPr>
+              <a:t>course_id</a:t>
+            </a:r>
+            <a:r>
+              <a:rPr lang="en-US" sz="1800" b="0" i="0" u="none" strike="noStrike" baseline="0" dirty="0">
+                <a:latin typeface="+mj-lt"/>
+              </a:rPr>
+              <a:t>, </a:t>
+            </a:r>
+            <a:r>
+              <a:rPr lang="en-US" sz="1800" b="0" i="1" u="none" strike="noStrike" baseline="0" dirty="0">
+                <a:latin typeface="+mj-lt"/>
+              </a:rPr>
+              <a:t>title</a:t>
+            </a:r>
+            <a:r>
+              <a:rPr lang="en-US" sz="1800" b="0" i="0" u="none" strike="noStrike" baseline="0" dirty="0">
+                <a:latin typeface="+mj-lt"/>
+              </a:rPr>
+              <a:t>, </a:t>
+            </a:r>
+            <a:r>
+              <a:rPr lang="en-US" sz="1800" b="0" i="1" u="none" strike="noStrike" baseline="0" dirty="0" err="1">
+                <a:latin typeface="+mj-lt"/>
+              </a:rPr>
+              <a:t>dept_name</a:t>
+            </a:r>
+            <a:r>
+              <a:rPr lang="en-US" sz="1800" b="0" i="0" u="none" strike="noStrike" baseline="0" dirty="0">
+                <a:latin typeface="+mj-lt"/>
+              </a:rPr>
+              <a:t>, </a:t>
+            </a:r>
+            <a:r>
+              <a:rPr lang="en-US" sz="1800" b="0" i="1" u="none" strike="noStrike" baseline="0" dirty="0">
+                <a:latin typeface="+mj-lt"/>
+              </a:rPr>
+              <a:t>credits</a:t>
+            </a:r>
+            <a:r>
+              <a:rPr lang="en-US" sz="1800" b="0" i="0" u="none" strike="noStrike" baseline="0" dirty="0">
+                <a:latin typeface="+mj-lt"/>
+              </a:rPr>
+              <a:t>)</a:t>
+            </a:r>
+          </a:p>
+          <a:p>
+            <a:pPr marL="0" indent="0" algn="l">
+              <a:buNone/>
+            </a:pPr>
+            <a:r>
+              <a:rPr lang="en-US" sz="1800" b="0" i="1" u="none" strike="noStrike" baseline="0" dirty="0">
+                <a:latin typeface="+mj-lt"/>
+              </a:rPr>
+              <a:t>instructor</a:t>
+            </a:r>
+            <a:r>
+              <a:rPr lang="en-US" sz="1800" b="0" i="0" u="none" strike="noStrike" baseline="0" dirty="0">
+                <a:latin typeface="+mj-lt"/>
+              </a:rPr>
+              <a:t>(</a:t>
+            </a:r>
+            <a:r>
+              <a:rPr lang="en-US" sz="1800" b="0" i="1" u="none" strike="noStrike" baseline="0" dirty="0">
+                <a:latin typeface="+mj-lt"/>
+              </a:rPr>
+              <a:t>ID</a:t>
+            </a:r>
+            <a:r>
+              <a:rPr lang="en-US" sz="1800" b="0" i="0" u="none" strike="noStrike" baseline="0" dirty="0">
+                <a:latin typeface="+mj-lt"/>
+              </a:rPr>
+              <a:t>, </a:t>
+            </a:r>
+            <a:r>
+              <a:rPr lang="en-US" sz="1800" b="0" i="1" u="none" strike="noStrike" baseline="0" dirty="0">
+                <a:latin typeface="+mj-lt"/>
+              </a:rPr>
+              <a:t>name</a:t>
+            </a:r>
+            <a:r>
+              <a:rPr lang="en-US" sz="1800" b="0" i="0" u="none" strike="noStrike" baseline="0" dirty="0">
+                <a:latin typeface="+mj-lt"/>
+              </a:rPr>
+              <a:t>, </a:t>
+            </a:r>
+            <a:r>
+              <a:rPr lang="en-US" sz="1800" b="0" i="1" u="none" strike="noStrike" baseline="0" dirty="0" err="1">
+                <a:latin typeface="+mj-lt"/>
+              </a:rPr>
+              <a:t>dept_name</a:t>
+            </a:r>
+            <a:r>
+              <a:rPr lang="en-US" sz="1800" b="0" i="0" u="none" strike="noStrike" baseline="0" dirty="0">
+                <a:latin typeface="+mj-lt"/>
+              </a:rPr>
+              <a:t>, </a:t>
+            </a:r>
+            <a:r>
+              <a:rPr lang="en-US" sz="1800" b="0" i="1" u="none" strike="noStrike" baseline="0" dirty="0">
+                <a:latin typeface="+mj-lt"/>
+              </a:rPr>
+              <a:t>salary</a:t>
+            </a:r>
+            <a:r>
+              <a:rPr lang="en-US" sz="1800" b="0" i="0" u="none" strike="noStrike" baseline="0" dirty="0">
+                <a:latin typeface="+mj-lt"/>
+              </a:rPr>
+              <a:t>)</a:t>
+            </a:r>
+          </a:p>
+          <a:p>
+            <a:pPr marL="0" indent="0" algn="l">
+              <a:buNone/>
+            </a:pPr>
+            <a:r>
+              <a:rPr lang="en-US" sz="1800" b="0" i="1" u="none" strike="noStrike" baseline="0" dirty="0">
+                <a:latin typeface="+mj-lt"/>
+              </a:rPr>
+              <a:t>section</a:t>
+            </a:r>
+            <a:r>
+              <a:rPr lang="en-US" sz="1800" b="0" i="0" u="none" strike="noStrike" baseline="0" dirty="0">
+                <a:latin typeface="+mj-lt"/>
+              </a:rPr>
+              <a:t>(</a:t>
+            </a:r>
+            <a:r>
+              <a:rPr lang="en-US" sz="1800" b="0" i="1" u="none" strike="noStrike" baseline="0" dirty="0" err="1">
+                <a:latin typeface="+mj-lt"/>
+              </a:rPr>
+              <a:t>course_id</a:t>
+            </a:r>
+            <a:r>
+              <a:rPr lang="en-US" sz="1800" b="0" i="0" u="none" strike="noStrike" baseline="0" dirty="0">
+                <a:latin typeface="+mj-lt"/>
+              </a:rPr>
+              <a:t>, </a:t>
+            </a:r>
+            <a:r>
+              <a:rPr lang="en-US" sz="1800" b="0" i="1" u="none" strike="noStrike" baseline="0" dirty="0" err="1">
+                <a:latin typeface="+mj-lt"/>
+              </a:rPr>
+              <a:t>sec_id</a:t>
+            </a:r>
+            <a:r>
+              <a:rPr lang="en-US" sz="1800" b="0" i="0" u="none" strike="noStrike" baseline="0" dirty="0">
+                <a:latin typeface="+mj-lt"/>
+              </a:rPr>
+              <a:t>, </a:t>
+            </a:r>
+            <a:r>
+              <a:rPr lang="en-US" sz="1800" b="0" i="1" u="none" strike="noStrike" baseline="0" dirty="0">
+                <a:latin typeface="+mj-lt"/>
+              </a:rPr>
+              <a:t>semester</a:t>
+            </a:r>
+            <a:r>
+              <a:rPr lang="en-US" sz="1800" b="0" i="0" u="none" strike="noStrike" baseline="0" dirty="0">
+                <a:latin typeface="+mj-lt"/>
+              </a:rPr>
+              <a:t>, </a:t>
+            </a:r>
+            <a:r>
+              <a:rPr lang="en-US" sz="1800" b="0" i="1" u="none" strike="noStrike" baseline="0" dirty="0">
+                <a:latin typeface="+mj-lt"/>
+              </a:rPr>
+              <a:t>year</a:t>
+            </a:r>
+            <a:r>
+              <a:rPr lang="en-US" sz="1800" b="0" i="0" u="none" strike="noStrike" baseline="0" dirty="0">
+                <a:latin typeface="+mj-lt"/>
+              </a:rPr>
+              <a:t>, </a:t>
+            </a:r>
+            <a:r>
+              <a:rPr lang="en-US" sz="1800" b="0" i="1" u="none" strike="noStrike" baseline="0" dirty="0">
+                <a:latin typeface="+mj-lt"/>
+              </a:rPr>
+              <a:t>building</a:t>
+            </a:r>
+            <a:r>
+              <a:rPr lang="en-US" sz="1800" b="0" i="0" u="none" strike="noStrike" baseline="0" dirty="0">
+                <a:latin typeface="+mj-lt"/>
+              </a:rPr>
+              <a:t>, </a:t>
+            </a:r>
+            <a:r>
+              <a:rPr lang="en-US" sz="1800" b="0" i="1" u="none" strike="noStrike" baseline="0" dirty="0">
+                <a:latin typeface="+mj-lt"/>
+              </a:rPr>
+              <a:t>room number</a:t>
+            </a:r>
+            <a:r>
+              <a:rPr lang="en-US" sz="1800" b="0" i="0" u="none" strike="noStrike" baseline="0" dirty="0">
+                <a:latin typeface="+mj-lt"/>
+              </a:rPr>
+              <a:t>, </a:t>
+            </a:r>
+            <a:r>
+              <a:rPr lang="en-US" sz="1800" b="0" i="1" u="none" strike="noStrike" baseline="0" dirty="0" err="1">
+                <a:latin typeface="+mj-lt"/>
+              </a:rPr>
+              <a:t>time_slot</a:t>
+            </a:r>
+            <a:r>
+              <a:rPr lang="en-US" sz="1800" i="1" dirty="0" err="1">
+                <a:latin typeface="+mj-lt"/>
+              </a:rPr>
+              <a:t>_</a:t>
+            </a:r>
+            <a:r>
+              <a:rPr lang="en-US" sz="1800" b="0" i="1" u="none" strike="noStrike" baseline="0" dirty="0" err="1">
+                <a:latin typeface="+mj-lt"/>
+              </a:rPr>
+              <a:t>id</a:t>
+            </a:r>
+            <a:r>
+              <a:rPr lang="en-US" sz="1800" b="0" i="0" u="none" strike="noStrike" baseline="0" dirty="0">
+                <a:latin typeface="+mj-lt"/>
+              </a:rPr>
+              <a:t>)</a:t>
+            </a:r>
+          </a:p>
+          <a:p>
+            <a:pPr marL="0" indent="0" algn="l">
+              <a:buNone/>
+            </a:pPr>
+            <a:r>
+              <a:rPr lang="en-US" sz="1800" b="0" i="1" u="none" strike="noStrike" baseline="0" dirty="0">
+                <a:latin typeface="+mj-lt"/>
+              </a:rPr>
+              <a:t>teaches</a:t>
+            </a:r>
+            <a:r>
+              <a:rPr lang="en-US" sz="1800" b="0" i="0" u="none" strike="noStrike" baseline="0" dirty="0">
+                <a:latin typeface="+mj-lt"/>
+              </a:rPr>
+              <a:t>(</a:t>
+            </a:r>
+            <a:r>
+              <a:rPr lang="en-US" sz="1800" b="0" i="1" u="none" strike="noStrike" baseline="0" dirty="0">
+                <a:latin typeface="+mj-lt"/>
+              </a:rPr>
+              <a:t>ID</a:t>
+            </a:r>
+            <a:r>
+              <a:rPr lang="en-US" sz="1800" b="0" i="0" u="none" strike="noStrike" baseline="0" dirty="0">
+                <a:latin typeface="+mj-lt"/>
+              </a:rPr>
+              <a:t>, </a:t>
+            </a:r>
+            <a:r>
+              <a:rPr lang="en-US" sz="1800" b="0" i="1" u="none" strike="noStrike" baseline="0" dirty="0" err="1">
+                <a:latin typeface="+mj-lt"/>
+              </a:rPr>
+              <a:t>course_id</a:t>
+            </a:r>
+            <a:r>
+              <a:rPr lang="en-US" sz="1800" b="0" i="0" u="none" strike="noStrike" baseline="0" dirty="0">
+                <a:latin typeface="+mj-lt"/>
+              </a:rPr>
+              <a:t>, </a:t>
+            </a:r>
+            <a:r>
+              <a:rPr lang="en-US" sz="1800" b="0" i="1" u="none" strike="noStrike" baseline="0" dirty="0" err="1">
+                <a:latin typeface="+mj-lt"/>
+              </a:rPr>
+              <a:t>sec_id</a:t>
+            </a:r>
+            <a:r>
+              <a:rPr lang="en-US" sz="1800" b="0" i="0" u="none" strike="noStrike" baseline="0" dirty="0">
+                <a:latin typeface="+mj-lt"/>
+              </a:rPr>
+              <a:t>, </a:t>
+            </a:r>
+            <a:r>
+              <a:rPr lang="en-US" sz="1800" b="0" i="1" u="none" strike="noStrike" baseline="0" dirty="0">
+                <a:latin typeface="+mj-lt"/>
+              </a:rPr>
+              <a:t>semester</a:t>
+            </a:r>
+            <a:r>
+              <a:rPr lang="en-US" sz="1800" b="0" i="0" u="none" strike="noStrike" baseline="0" dirty="0">
+                <a:latin typeface="+mj-lt"/>
+              </a:rPr>
+              <a:t>, </a:t>
+            </a:r>
+            <a:r>
+              <a:rPr lang="en-US" sz="1800" b="0" i="1" u="none" strike="noStrike" baseline="0" dirty="0">
+                <a:latin typeface="+mj-lt"/>
+              </a:rPr>
+              <a:t>year</a:t>
+            </a:r>
+            <a:r>
+              <a:rPr lang="en-US" sz="1800" b="0" i="0" u="none" strike="noStrike" baseline="0" dirty="0">
+                <a:latin typeface="+mj-lt"/>
+              </a:rPr>
+              <a:t>)</a:t>
+            </a:r>
+          </a:p>
+          <a:p>
+            <a:pPr marL="0" indent="0" algn="l">
+              <a:buNone/>
+            </a:pPr>
+            <a:r>
+              <a:rPr lang="en-US" sz="1800" b="0" i="1" u="none" strike="noStrike" baseline="0" dirty="0">
+                <a:latin typeface="+mj-lt"/>
+              </a:rPr>
+              <a:t>student</a:t>
+            </a:r>
+            <a:r>
+              <a:rPr lang="en-US" sz="1800" b="0" i="0" u="none" strike="noStrike" baseline="0" dirty="0">
+                <a:latin typeface="+mj-lt"/>
+              </a:rPr>
+              <a:t>(</a:t>
+            </a:r>
+            <a:r>
+              <a:rPr lang="en-US" sz="1800" b="0" i="1" u="none" strike="noStrike" baseline="0" dirty="0">
+                <a:latin typeface="+mj-lt"/>
+              </a:rPr>
+              <a:t>ID</a:t>
+            </a:r>
+            <a:r>
+              <a:rPr lang="en-US" sz="1800" b="0" i="0" u="none" strike="noStrike" baseline="0" dirty="0">
+                <a:latin typeface="+mj-lt"/>
+              </a:rPr>
+              <a:t>, </a:t>
+            </a:r>
+            <a:r>
+              <a:rPr lang="en-US" sz="1800" b="0" i="1" u="none" strike="noStrike" baseline="0" dirty="0">
+                <a:latin typeface="+mj-lt"/>
+              </a:rPr>
+              <a:t>name</a:t>
+            </a:r>
+            <a:r>
+              <a:rPr lang="en-US" sz="1800" b="0" i="0" u="none" strike="noStrike" baseline="0" dirty="0">
+                <a:latin typeface="+mj-lt"/>
+              </a:rPr>
+              <a:t>, </a:t>
+            </a:r>
+            <a:r>
+              <a:rPr lang="en-US" sz="1800" b="0" i="1" u="none" strike="noStrike" baseline="0" dirty="0" err="1">
+                <a:latin typeface="+mj-lt"/>
+              </a:rPr>
+              <a:t>dept_name</a:t>
+            </a:r>
+            <a:r>
+              <a:rPr lang="en-US" sz="1800" b="0" i="0" u="none" strike="noStrike" baseline="0" dirty="0">
+                <a:latin typeface="+mj-lt"/>
+              </a:rPr>
+              <a:t>, </a:t>
+            </a:r>
+            <a:r>
+              <a:rPr lang="en-US" sz="1800" b="0" i="1" u="none" strike="noStrike" baseline="0" dirty="0">
+                <a:latin typeface="+mj-lt"/>
+              </a:rPr>
+              <a:t>tot cred</a:t>
+            </a:r>
+            <a:r>
+              <a:rPr lang="en-US" sz="1800" b="0" i="0" u="none" strike="noStrike" baseline="0" dirty="0">
+                <a:latin typeface="+mj-lt"/>
+              </a:rPr>
+              <a:t>)</a:t>
+            </a:r>
+          </a:p>
+          <a:p>
+            <a:pPr marL="0" indent="0" algn="l">
+              <a:buNone/>
+            </a:pPr>
+            <a:r>
+              <a:rPr lang="en-US" sz="1800" b="0" i="1" u="none" strike="noStrike" baseline="0" dirty="0">
+                <a:latin typeface="+mj-lt"/>
+              </a:rPr>
+              <a:t>takes</a:t>
+            </a:r>
+            <a:r>
+              <a:rPr lang="en-US" sz="1800" b="0" i="0" u="none" strike="noStrike" baseline="0" dirty="0">
+                <a:latin typeface="+mj-lt"/>
+              </a:rPr>
+              <a:t>(</a:t>
+            </a:r>
+            <a:r>
+              <a:rPr lang="en-US" sz="1800" b="0" i="1" u="none" strike="noStrike" baseline="0" dirty="0">
+                <a:latin typeface="+mj-lt"/>
+              </a:rPr>
+              <a:t>ID</a:t>
+            </a:r>
+            <a:r>
+              <a:rPr lang="en-US" sz="1800" b="0" i="0" u="none" strike="noStrike" baseline="0" dirty="0">
+                <a:latin typeface="+mj-lt"/>
+              </a:rPr>
+              <a:t>, </a:t>
+            </a:r>
+            <a:r>
+              <a:rPr lang="en-US" sz="1800" b="0" i="1" u="none" strike="noStrike" baseline="0" dirty="0" err="1">
+                <a:latin typeface="+mj-lt"/>
+              </a:rPr>
+              <a:t>course_id</a:t>
+            </a:r>
+            <a:r>
+              <a:rPr lang="en-US" sz="1800" b="0" i="0" u="none" strike="noStrike" baseline="0" dirty="0">
+                <a:latin typeface="+mj-lt"/>
+              </a:rPr>
+              <a:t>, </a:t>
+            </a:r>
+            <a:r>
+              <a:rPr lang="en-US" sz="1800" b="0" i="1" u="none" strike="noStrike" baseline="0" dirty="0" err="1">
+                <a:latin typeface="+mj-lt"/>
+              </a:rPr>
+              <a:t>sec_id</a:t>
+            </a:r>
+            <a:r>
+              <a:rPr lang="en-US" sz="1800" b="0" i="0" u="none" strike="noStrike" baseline="0" dirty="0">
+                <a:latin typeface="+mj-lt"/>
+              </a:rPr>
+              <a:t>, </a:t>
+            </a:r>
+            <a:r>
+              <a:rPr lang="en-US" sz="1800" b="0" i="1" u="none" strike="noStrike" baseline="0" dirty="0">
+                <a:latin typeface="+mj-lt"/>
+              </a:rPr>
+              <a:t>semester</a:t>
+            </a:r>
+            <a:r>
+              <a:rPr lang="en-US" sz="1800" b="0" i="0" u="none" strike="noStrike" baseline="0" dirty="0">
+                <a:latin typeface="+mj-lt"/>
+              </a:rPr>
+              <a:t>, </a:t>
+            </a:r>
+            <a:r>
+              <a:rPr lang="en-US" sz="1800" b="0" i="1" u="none" strike="noStrike" baseline="0" dirty="0">
+                <a:latin typeface="+mj-lt"/>
+              </a:rPr>
+              <a:t>year</a:t>
+            </a:r>
+            <a:r>
+              <a:rPr lang="en-US" sz="1800" b="0" i="0" u="none" strike="noStrike" baseline="0" dirty="0">
+                <a:latin typeface="+mj-lt"/>
+              </a:rPr>
+              <a:t>, </a:t>
+            </a:r>
+            <a:r>
+              <a:rPr lang="en-US" sz="1800" b="0" i="1" u="none" strike="noStrike" baseline="0" dirty="0">
+                <a:latin typeface="+mj-lt"/>
+              </a:rPr>
+              <a:t>grade</a:t>
+            </a:r>
+            <a:r>
+              <a:rPr lang="en-US" sz="1800" b="0" i="0" u="none" strike="noStrike" baseline="0" dirty="0">
+                <a:latin typeface="+mj-lt"/>
+              </a:rPr>
+              <a:t>)</a:t>
+            </a:r>
+          </a:p>
+          <a:p>
+            <a:pPr marL="0" indent="0" algn="l">
+              <a:buNone/>
+            </a:pPr>
+            <a:r>
+              <a:rPr lang="en-US" sz="1800" b="0" i="1" u="none" strike="noStrike" baseline="0" dirty="0">
+                <a:latin typeface="+mj-lt"/>
+              </a:rPr>
+              <a:t>advisor</a:t>
+            </a:r>
+            <a:r>
+              <a:rPr lang="en-US" sz="1800" b="0" i="0" u="none" strike="noStrike" baseline="0" dirty="0">
+                <a:latin typeface="+mj-lt"/>
+              </a:rPr>
+              <a:t>(</a:t>
+            </a:r>
+            <a:r>
+              <a:rPr lang="en-US" sz="1800" b="0" i="1" u="none" strike="noStrike" baseline="0" dirty="0" err="1">
+                <a:latin typeface="+mj-lt"/>
+              </a:rPr>
+              <a:t>s_ID</a:t>
+            </a:r>
+            <a:r>
+              <a:rPr lang="en-US" sz="1800" b="0" i="0" u="none" strike="noStrike" baseline="0" dirty="0">
+                <a:latin typeface="+mj-lt"/>
+              </a:rPr>
+              <a:t>, </a:t>
+            </a:r>
+            <a:r>
+              <a:rPr lang="en-US" sz="1800" b="0" i="1" u="none" strike="noStrike" baseline="0" dirty="0" err="1">
+                <a:latin typeface="+mj-lt"/>
+              </a:rPr>
+              <a:t>i</a:t>
+            </a:r>
+            <a:r>
+              <a:rPr lang="en-US" sz="1800" i="1" dirty="0" err="1">
+                <a:latin typeface="+mj-lt"/>
+              </a:rPr>
+              <a:t>_</a:t>
+            </a:r>
+            <a:r>
+              <a:rPr lang="en-US" sz="1800" b="0" i="1" u="none" strike="noStrike" baseline="0" dirty="0" err="1">
+                <a:latin typeface="+mj-lt"/>
+              </a:rPr>
+              <a:t>ID</a:t>
+            </a:r>
+            <a:r>
+              <a:rPr lang="en-US" sz="1800" b="0" i="0" u="none" strike="noStrike" baseline="0" dirty="0">
+                <a:latin typeface="+mj-lt"/>
+              </a:rPr>
+              <a:t>)</a:t>
+            </a:r>
+          </a:p>
+          <a:p>
+            <a:pPr marL="0" indent="0" algn="l">
+              <a:buNone/>
+            </a:pPr>
+            <a:r>
+              <a:rPr lang="en-US" sz="1800" b="0" i="1" u="none" strike="noStrike" baseline="0" dirty="0" err="1">
+                <a:latin typeface="+mj-lt"/>
+              </a:rPr>
+              <a:t>time_slot</a:t>
+            </a:r>
+            <a:r>
+              <a:rPr lang="en-US" sz="1800" b="0" i="0" u="none" strike="noStrike" baseline="0" dirty="0">
+                <a:latin typeface="+mj-lt"/>
+              </a:rPr>
+              <a:t>(</a:t>
+            </a:r>
+            <a:r>
+              <a:rPr lang="en-US" sz="1800" b="0" i="1" u="none" strike="noStrike" baseline="0" dirty="0" err="1">
+                <a:latin typeface="+mj-lt"/>
+              </a:rPr>
+              <a:t>time_slot_id</a:t>
+            </a:r>
+            <a:r>
+              <a:rPr lang="en-US" sz="1800" b="0" i="0" u="none" strike="noStrike" baseline="0" dirty="0">
+                <a:latin typeface="+mj-lt"/>
+              </a:rPr>
+              <a:t>, </a:t>
+            </a:r>
+            <a:r>
+              <a:rPr lang="en-US" sz="1800" b="0" i="1" u="none" strike="noStrike" baseline="0" dirty="0">
+                <a:latin typeface="+mj-lt"/>
+              </a:rPr>
+              <a:t>day</a:t>
+            </a:r>
+            <a:r>
+              <a:rPr lang="en-US" sz="1800" b="0" i="0" u="none" strike="noStrike" baseline="0" dirty="0">
+                <a:latin typeface="+mj-lt"/>
+              </a:rPr>
+              <a:t>, </a:t>
+            </a:r>
+            <a:r>
+              <a:rPr lang="en-US" sz="1800" b="0" i="1" u="none" strike="noStrike" baseline="0" dirty="0">
+                <a:latin typeface="+mj-lt"/>
+              </a:rPr>
+              <a:t>start time</a:t>
+            </a:r>
+            <a:r>
+              <a:rPr lang="en-US" sz="1800" b="0" i="0" u="none" strike="noStrike" baseline="0" dirty="0">
+                <a:latin typeface="+mj-lt"/>
+              </a:rPr>
+              <a:t>, </a:t>
+            </a:r>
+            <a:r>
+              <a:rPr lang="en-US" sz="1800" b="0" i="1" u="none" strike="noStrike" baseline="0" dirty="0">
+                <a:latin typeface="+mj-lt"/>
+              </a:rPr>
+              <a:t>end time</a:t>
+            </a:r>
+            <a:r>
+              <a:rPr lang="en-US" sz="1800" b="0" i="0" u="none" strike="noStrike" baseline="0" dirty="0">
+                <a:latin typeface="+mj-lt"/>
+              </a:rPr>
+              <a:t>)</a:t>
+            </a:r>
+          </a:p>
+          <a:p>
+            <a:pPr marL="0" indent="0" algn="l">
+              <a:buNone/>
+            </a:pPr>
+            <a:r>
+              <a:rPr lang="en-US" sz="1800" b="0" i="1" u="none" strike="noStrike" baseline="0" dirty="0" err="1">
+                <a:latin typeface="+mj-lt"/>
+              </a:rPr>
+              <a:t>prereq</a:t>
+            </a:r>
+            <a:r>
+              <a:rPr lang="en-US" sz="1800" b="0" i="0" u="none" strike="noStrike" baseline="0" dirty="0">
+                <a:latin typeface="+mj-lt"/>
+              </a:rPr>
+              <a:t>(</a:t>
+            </a:r>
+            <a:r>
+              <a:rPr lang="en-US" sz="1800" b="0" i="1" u="none" strike="noStrike" baseline="0" dirty="0" err="1">
+                <a:latin typeface="+mj-lt"/>
+              </a:rPr>
+              <a:t>course_id</a:t>
+            </a:r>
+            <a:r>
+              <a:rPr lang="en-US" sz="1800" b="0" i="0" u="none" strike="noStrike" baseline="0" dirty="0">
+                <a:latin typeface="+mj-lt"/>
+              </a:rPr>
+              <a:t>, </a:t>
+            </a:r>
+            <a:r>
+              <a:rPr lang="en-US" sz="1800" b="0" i="1" u="none" strike="noStrike" baseline="0" dirty="0" err="1">
+                <a:latin typeface="+mj-lt"/>
+              </a:rPr>
+              <a:t>prereq_id</a:t>
+            </a:r>
+            <a:r>
+              <a:rPr lang="en-US" sz="1800" b="0" i="0" u="none" strike="noStrike" baseline="0" dirty="0">
+                <a:latin typeface="+mj-lt"/>
+              </a:rPr>
+              <a:t>)</a:t>
+            </a:r>
+            <a:endParaRPr lang="en-US" sz="2400" dirty="0">
+              <a:latin typeface="+mj-lt"/>
+            </a:endParaRPr>
+          </a:p>
+        </p:txBody>
+      </p:sp>
+      <p:sp>
+        <p:nvSpPr>
+          <p:cNvPr id="4" name="Slide Number Placeholder 3">
+            <a:extLst>
+              <a:ext uri="{FF2B5EF4-FFF2-40B4-BE49-F238E27FC236}">
+                <a16:creationId xmlns:a16="http://schemas.microsoft.com/office/drawing/2014/main" id="{BBA48AFF-313F-7465-BCFD-E5E2E70E70BA}"/>
+              </a:ext>
+            </a:extLst>
+          </p:cNvPr>
+          <p:cNvSpPr>
+            <a:spLocks noGrp="1"/>
+          </p:cNvSpPr>
+          <p:nvPr>
+            <p:ph type="sldNum" sz="quarter" idx="10"/>
+          </p:nvPr>
+        </p:nvSpPr>
+        <p:spPr/>
+        <p:txBody>
+          <a:bodyPr/>
+          <a:lstStyle/>
+          <a:p>
+            <a:pPr>
+              <a:defRPr/>
+            </a:pPr>
+            <a:fld id="{547F3CAF-32BF-49A6-93F1-59C9E4B7C957}" type="slidenum">
+              <a:rPr lang="en-US" altLang="en-US" smtClean="0"/>
+              <a:pPr>
+                <a:defRPr/>
+              </a:pPr>
+              <a:t>13</a:t>
+            </a:fld>
+            <a:endParaRPr lang="en-US" altLang="en-US" dirty="0"/>
+          </a:p>
+        </p:txBody>
+      </p:sp>
+    </p:spTree>
+    <p:extLst>
+      <p:ext uri="{BB962C8B-B14F-4D97-AF65-F5344CB8AC3E}">
+        <p14:creationId xmlns:p14="http://schemas.microsoft.com/office/powerpoint/2010/main" val="2581575707"/>
+      </p:ext>
+    </p:extLst>
+  </p:cSld>
+  <p:clrMapOvr>
+    <a:masterClrMapping/>
+  </p:clrMapOvr>
+</p:sld>
+</file>
+
+<file path=ppt/slides/slide14.xml><?xml version="1.0" encoding="utf-8"?>
+<p:sld xmlns:a="http://schemas.openxmlformats.org/drawingml/2006/main" xmlns:r="http://schemas.openxmlformats.org/officeDocument/2006/relationships" xmlns:p="http://schemas.openxmlformats.org/presentationml/2006/main">
+  <p:cSld>
+    <p:spTree>
+      <p:nvGrpSpPr>
+        <p:cNvPr id="1" name="">
+          <a:extLst>
+            <a:ext uri="{FF2B5EF4-FFF2-40B4-BE49-F238E27FC236}">
+              <a16:creationId xmlns:a16="http://schemas.microsoft.com/office/drawing/2014/main" id="{524B7BDD-07CD-716F-DB25-C0028C40AD2A}"/>
+            </a:ext>
+          </a:extLst>
+        </p:cNvPr>
+        <p:cNvGrpSpPr/>
+        <p:nvPr/>
+      </p:nvGrpSpPr>
+      <p:grpSpPr>
+        <a:xfrm>
+          <a:off x="0" y="0"/>
+          <a:ext cx="0" cy="0"/>
+          <a:chOff x="0" y="0"/>
+          <a:chExt cx="0" cy="0"/>
+        </a:xfrm>
+      </p:grpSpPr>
+      <p:sp>
+        <p:nvSpPr>
+          <p:cNvPr id="2" name="Title 1">
+            <a:extLst>
+              <a:ext uri="{FF2B5EF4-FFF2-40B4-BE49-F238E27FC236}">
+                <a16:creationId xmlns:a16="http://schemas.microsoft.com/office/drawing/2014/main" id="{1B9271B6-A17B-A080-6DFF-495CAF0CC1A5}"/>
+              </a:ext>
+            </a:extLst>
+          </p:cNvPr>
+          <p:cNvSpPr>
+            <a:spLocks noGrp="1"/>
+          </p:cNvSpPr>
+          <p:nvPr>
+            <p:ph type="title"/>
+          </p:nvPr>
+        </p:nvSpPr>
+        <p:spPr/>
+        <p:txBody>
+          <a:bodyPr/>
+          <a:lstStyle/>
+          <a:p>
+            <a:pPr algn="ctr"/>
+            <a:r>
+              <a:rPr lang="en-NZ" sz="3600" dirty="0"/>
+              <a:t>Appendix:</a:t>
+            </a:r>
+            <a:br>
+              <a:rPr lang="en-NZ" sz="3600" dirty="0"/>
+            </a:br>
+            <a:r>
+              <a:rPr lang="en-NZ" sz="3600" dirty="0"/>
+              <a:t>University Database</a:t>
+            </a:r>
+            <a:endParaRPr lang="en-US" sz="3600" dirty="0"/>
+          </a:p>
+        </p:txBody>
+      </p:sp>
+      <p:sp>
+        <p:nvSpPr>
+          <p:cNvPr id="4" name="Slide Number Placeholder 3">
+            <a:extLst>
+              <a:ext uri="{FF2B5EF4-FFF2-40B4-BE49-F238E27FC236}">
+                <a16:creationId xmlns:a16="http://schemas.microsoft.com/office/drawing/2014/main" id="{E6F3EC15-BF99-3BF7-D884-134993E913C5}"/>
+              </a:ext>
+            </a:extLst>
+          </p:cNvPr>
+          <p:cNvSpPr>
+            <a:spLocks noGrp="1"/>
+          </p:cNvSpPr>
+          <p:nvPr>
+            <p:ph type="sldNum" sz="quarter" idx="10"/>
+          </p:nvPr>
+        </p:nvSpPr>
+        <p:spPr/>
+        <p:txBody>
+          <a:bodyPr/>
+          <a:lstStyle/>
+          <a:p>
+            <a:pPr>
+              <a:defRPr/>
+            </a:pPr>
+            <a:fld id="{547F3CAF-32BF-49A6-93F1-59C9E4B7C957}" type="slidenum">
+              <a:rPr lang="en-US" altLang="en-US" smtClean="0"/>
+              <a:pPr>
+                <a:defRPr/>
+              </a:pPr>
+              <a:t>14</a:t>
+            </a:fld>
+            <a:endParaRPr lang="en-US" altLang="en-US" dirty="0"/>
+          </a:p>
+        </p:txBody>
+      </p:sp>
+      <p:sp>
+        <p:nvSpPr>
+          <p:cNvPr id="5" name="Content Placeholder 4">
+            <a:extLst>
+              <a:ext uri="{FF2B5EF4-FFF2-40B4-BE49-F238E27FC236}">
+                <a16:creationId xmlns:a16="http://schemas.microsoft.com/office/drawing/2014/main" id="{E8E27C8B-7092-7326-2E1D-25CEF3081AA9}"/>
+              </a:ext>
+            </a:extLst>
+          </p:cNvPr>
+          <p:cNvSpPr>
+            <a:spLocks noGrp="1"/>
+          </p:cNvSpPr>
+          <p:nvPr>
+            <p:ph idx="1"/>
+          </p:nvPr>
+        </p:nvSpPr>
+        <p:spPr/>
+        <p:txBody>
+          <a:bodyPr/>
+          <a:lstStyle/>
+          <a:p>
+            <a:endParaRPr lang="en-US"/>
+          </a:p>
+        </p:txBody>
+      </p:sp>
+      <p:pic>
+        <p:nvPicPr>
+          <p:cNvPr id="7" name="Picture 6">
+            <a:extLst>
+              <a:ext uri="{FF2B5EF4-FFF2-40B4-BE49-F238E27FC236}">
+                <a16:creationId xmlns:a16="http://schemas.microsoft.com/office/drawing/2014/main" id="{99720C1E-88CC-C9BF-2CD4-382BE11F93F1}"/>
+              </a:ext>
+            </a:extLst>
+          </p:cNvPr>
+          <p:cNvPicPr>
+            <a:picLocks noChangeAspect="1"/>
+          </p:cNvPicPr>
+          <p:nvPr/>
+        </p:nvPicPr>
+        <p:blipFill>
+          <a:blip r:embed="rId3"/>
+          <a:stretch>
+            <a:fillRect/>
+          </a:stretch>
+        </p:blipFill>
+        <p:spPr>
+          <a:xfrm>
+            <a:off x="408994" y="1809296"/>
+            <a:ext cx="8326012" cy="5020376"/>
+          </a:xfrm>
+          <a:prstGeom prst="rect">
+            <a:avLst/>
+          </a:prstGeom>
+        </p:spPr>
+      </p:pic>
+    </p:spTree>
+    <p:extLst>
+      <p:ext uri="{BB962C8B-B14F-4D97-AF65-F5344CB8AC3E}">
+        <p14:creationId xmlns:p14="http://schemas.microsoft.com/office/powerpoint/2010/main" val="372386006"/>
+      </p:ext>
+    </p:extLst>
+  </p:cSld>
+  <p:clrMapOvr>
+    <a:masterClrMapping/>
+  </p:clrMapOvr>
+</p:sld>
+</file>
+
+<file path=ppt/slides/slide15.xml><?xml version="1.0" encoding="utf-8"?>
+<p:sld xmlns:a="http://schemas.openxmlformats.org/drawingml/2006/main" xmlns:r="http://schemas.openxmlformats.org/officeDocument/2006/relationships" xmlns:p="http://schemas.openxmlformats.org/presentationml/2006/main">
+  <p:cSld>
+    <p:spTree>
+      <p:nvGrpSpPr>
+        <p:cNvPr id="1" name="">
+          <a:extLst>
+            <a:ext uri="{FF2B5EF4-FFF2-40B4-BE49-F238E27FC236}">
+              <a16:creationId xmlns:a16="http://schemas.microsoft.com/office/drawing/2014/main" id="{755C3A4D-2C6F-5F28-222E-7647E074F570}"/>
+            </a:ext>
+          </a:extLst>
+        </p:cNvPr>
+        <p:cNvGrpSpPr/>
+        <p:nvPr/>
+      </p:nvGrpSpPr>
+      <p:grpSpPr>
+        <a:xfrm>
+          <a:off x="0" y="0"/>
+          <a:ext cx="0" cy="0"/>
+          <a:chOff x="0" y="0"/>
+          <a:chExt cx="0" cy="0"/>
+        </a:xfrm>
+      </p:grpSpPr>
+      <p:sp>
+        <p:nvSpPr>
+          <p:cNvPr id="2" name="Title 1">
+            <a:extLst>
+              <a:ext uri="{FF2B5EF4-FFF2-40B4-BE49-F238E27FC236}">
+                <a16:creationId xmlns:a16="http://schemas.microsoft.com/office/drawing/2014/main" id="{44DBB445-C0BA-33FC-72B5-8631B85471B7}"/>
+              </a:ext>
+            </a:extLst>
+          </p:cNvPr>
+          <p:cNvSpPr>
+            <a:spLocks noGrp="1"/>
+          </p:cNvSpPr>
+          <p:nvPr>
+            <p:ph type="title"/>
+          </p:nvPr>
+        </p:nvSpPr>
+        <p:spPr/>
+        <p:txBody>
+          <a:bodyPr/>
+          <a:lstStyle/>
+          <a:p>
+            <a:pPr algn="ctr"/>
+            <a:r>
+              <a:rPr lang="en-NZ" sz="3600" dirty="0"/>
+              <a:t>Appendix:</a:t>
+            </a:r>
+            <a:br>
+              <a:rPr lang="en-NZ" sz="3600" dirty="0"/>
+            </a:br>
+            <a:r>
+              <a:rPr lang="en-NZ" sz="3600" dirty="0"/>
+              <a:t>University Database</a:t>
+            </a:r>
+            <a:endParaRPr lang="en-US" sz="3600" dirty="0"/>
+          </a:p>
+        </p:txBody>
+      </p:sp>
+      <p:sp>
+        <p:nvSpPr>
+          <p:cNvPr id="4" name="Slide Number Placeholder 3">
+            <a:extLst>
+              <a:ext uri="{FF2B5EF4-FFF2-40B4-BE49-F238E27FC236}">
+                <a16:creationId xmlns:a16="http://schemas.microsoft.com/office/drawing/2014/main" id="{CEFF84A3-8BF8-897A-F84B-3A515A930B45}"/>
+              </a:ext>
+            </a:extLst>
+          </p:cNvPr>
+          <p:cNvSpPr>
+            <a:spLocks noGrp="1"/>
+          </p:cNvSpPr>
+          <p:nvPr>
+            <p:ph type="sldNum" sz="quarter" idx="10"/>
+          </p:nvPr>
+        </p:nvSpPr>
+        <p:spPr/>
+        <p:txBody>
+          <a:bodyPr/>
+          <a:lstStyle/>
+          <a:p>
+            <a:pPr>
+              <a:defRPr/>
+            </a:pPr>
+            <a:fld id="{547F3CAF-32BF-49A6-93F1-59C9E4B7C957}" type="slidenum">
+              <a:rPr lang="en-US" altLang="en-US" smtClean="0"/>
+              <a:pPr>
+                <a:defRPr/>
+              </a:pPr>
+              <a:t>15</a:t>
+            </a:fld>
+            <a:endParaRPr lang="en-US" altLang="en-US" dirty="0"/>
+          </a:p>
+        </p:txBody>
+      </p:sp>
+      <p:pic>
+        <p:nvPicPr>
+          <p:cNvPr id="11" name="Picture 10">
+            <a:extLst>
+              <a:ext uri="{FF2B5EF4-FFF2-40B4-BE49-F238E27FC236}">
+                <a16:creationId xmlns:a16="http://schemas.microsoft.com/office/drawing/2014/main" id="{C87985A5-F9B3-41F6-F8E7-982911A91940}"/>
+              </a:ext>
+            </a:extLst>
+          </p:cNvPr>
+          <p:cNvPicPr>
+            <a:picLocks noChangeAspect="1"/>
+          </p:cNvPicPr>
+          <p:nvPr/>
+        </p:nvPicPr>
+        <p:blipFill>
+          <a:blip r:embed="rId3"/>
+          <a:stretch>
+            <a:fillRect/>
+          </a:stretch>
+        </p:blipFill>
+        <p:spPr>
+          <a:xfrm>
+            <a:off x="578886" y="2441063"/>
+            <a:ext cx="3271203" cy="3271203"/>
+          </a:xfrm>
+          <a:prstGeom prst="rect">
+            <a:avLst/>
+          </a:prstGeom>
+        </p:spPr>
+      </p:pic>
+      <p:sp>
+        <p:nvSpPr>
+          <p:cNvPr id="13" name="Content Placeholder 12">
+            <a:extLst>
+              <a:ext uri="{FF2B5EF4-FFF2-40B4-BE49-F238E27FC236}">
+                <a16:creationId xmlns:a16="http://schemas.microsoft.com/office/drawing/2014/main" id="{F5C75FDC-C84F-89EC-90D8-40EC813B3BEA}"/>
+              </a:ext>
+            </a:extLst>
+          </p:cNvPr>
+          <p:cNvSpPr>
+            <a:spLocks noGrp="1"/>
+          </p:cNvSpPr>
+          <p:nvPr>
+            <p:ph idx="1"/>
+          </p:nvPr>
+        </p:nvSpPr>
+        <p:spPr>
+          <a:xfrm>
+            <a:off x="4620307" y="2441063"/>
+            <a:ext cx="3993115" cy="1429791"/>
+          </a:xfrm>
+        </p:spPr>
+        <p:txBody>
+          <a:bodyPr/>
+          <a:lstStyle/>
+          <a:p>
+            <a:pPr marL="0" indent="0">
+              <a:buNone/>
+            </a:pPr>
+            <a:r>
+              <a:rPr lang="en-US" sz="2400" dirty="0">
+                <a:effectLst/>
+                <a:hlinkClick r:id="rId4"/>
+              </a:rPr>
+              <a:t>https://www.db-book.com/university-lab-dir/sqljs.html</a:t>
+            </a:r>
+            <a:endParaRPr lang="en-NZ" sz="2400" dirty="0"/>
+          </a:p>
+          <a:p>
+            <a:pPr marL="0" indent="0">
+              <a:buNone/>
+            </a:pPr>
+            <a:endParaRPr lang="en-NZ" sz="2400" dirty="0"/>
+          </a:p>
+          <a:p>
+            <a:pPr marL="0" indent="0">
+              <a:buNone/>
+            </a:pPr>
+            <a:r>
+              <a:rPr lang="en-NZ" sz="2400" dirty="0"/>
+              <a:t>&lt;- Online SQL interpreter</a:t>
+            </a:r>
+          </a:p>
+          <a:p>
+            <a:pPr marL="0" indent="0">
+              <a:buNone/>
+            </a:pPr>
+            <a:endParaRPr lang="en-NZ" sz="2400" dirty="0"/>
+          </a:p>
+          <a:p>
+            <a:pPr marL="0" indent="0">
+              <a:buNone/>
+            </a:pPr>
+            <a:r>
+              <a:rPr lang="en-NZ" sz="2400" dirty="0"/>
+              <a:t>University database loaded</a:t>
+            </a:r>
+            <a:endParaRPr lang="en-US" sz="2400" dirty="0"/>
+          </a:p>
+        </p:txBody>
+      </p:sp>
+    </p:spTree>
+    <p:extLst>
+      <p:ext uri="{BB962C8B-B14F-4D97-AF65-F5344CB8AC3E}">
+        <p14:creationId xmlns:p14="http://schemas.microsoft.com/office/powerpoint/2010/main" val="1599183806"/>
+      </p:ext>
+    </p:extLst>
+  </p:cSld>
+  <p:clrMapOvr>
+    <a:masterClrMapping/>
+  </p:clrMapOvr>
+</p:sld>
+</file>
+
+<file path=ppt/slides/slide16.xml><?xml version="1.0" encoding="utf-8"?>
 <p:sld xmlns:a="http://schemas.openxmlformats.org/drawingml/2006/main" xmlns:r="http://schemas.openxmlformats.org/officeDocument/2006/relationships" xmlns:p="http://schemas.openxmlformats.org/presentationml/2006/main">
   <p:cSld>
     <p:spTree>
@@ -5940,10 +8972,200 @@
       </p:grpSpPr>
       <p:sp>
         <p:nvSpPr>
+          <p:cNvPr id="2" name="object 2"/>
+          <p:cNvSpPr/>
+          <p:nvPr/>
+        </p:nvSpPr>
+        <p:spPr>
+          <a:xfrm>
+            <a:off x="0" y="0"/>
+            <a:ext cx="9144000" cy="6858000"/>
+          </a:xfrm>
+          <a:custGeom>
+            <a:avLst/>
+            <a:gdLst/>
+            <a:ahLst/>
+            <a:cxnLst/>
+            <a:rect l="l" t="t" r="r" b="b"/>
+            <a:pathLst>
+              <a:path w="5760085" h="3240405">
+                <a:moveTo>
+                  <a:pt x="5759996" y="0"/>
+                </a:moveTo>
+                <a:lnTo>
+                  <a:pt x="0" y="0"/>
+                </a:lnTo>
+                <a:lnTo>
+                  <a:pt x="0" y="3239998"/>
+                </a:lnTo>
+                <a:lnTo>
+                  <a:pt x="5759996" y="3239998"/>
+                </a:lnTo>
+                <a:lnTo>
+                  <a:pt x="5759996" y="0"/>
+                </a:lnTo>
+                <a:close/>
+              </a:path>
+            </a:pathLst>
+          </a:custGeom>
+          <a:solidFill>
+            <a:srgbClr val="0054A0"/>
+          </a:solidFill>
+        </p:spPr>
+        <p:txBody>
+          <a:bodyPr wrap="square" lIns="0" tIns="0" rIns="0" bIns="0" rtlCol="0"/>
+          <a:lstStyle/>
+          <a:p>
+            <a:endParaRPr sz="2537"/>
+          </a:p>
+        </p:txBody>
+      </p:sp>
+      <p:pic>
+        <p:nvPicPr>
+          <p:cNvPr id="3" name="object 3"/>
+          <p:cNvPicPr/>
+          <p:nvPr/>
+        </p:nvPicPr>
+        <p:blipFill>
+          <a:blip r:embed="rId3" cstate="print"/>
+          <a:stretch>
+            <a:fillRect/>
+          </a:stretch>
+        </p:blipFill>
+        <p:spPr>
+          <a:xfrm>
+            <a:off x="6435597" y="346486"/>
+            <a:ext cx="2492957" cy="488217"/>
+          </a:xfrm>
+          <a:prstGeom prst="rect">
+            <a:avLst/>
+          </a:prstGeom>
+        </p:spPr>
+      </p:pic>
+      <p:sp>
+        <p:nvSpPr>
+          <p:cNvPr id="4" name="object 4"/>
+          <p:cNvSpPr txBox="1"/>
+          <p:nvPr/>
+        </p:nvSpPr>
+        <p:spPr>
+          <a:xfrm>
+            <a:off x="3853912" y="3160315"/>
+            <a:ext cx="1427995" cy="881151"/>
+          </a:xfrm>
+          <a:prstGeom prst="rect">
+            <a:avLst/>
+          </a:prstGeom>
+        </p:spPr>
+        <p:txBody>
+          <a:bodyPr vert="horz" wrap="square" lIns="0" tIns="27190" rIns="0" bIns="0" rtlCol="0">
+            <a:spAutoFit/>
+          </a:bodyPr>
+          <a:lstStyle/>
+          <a:p>
+            <a:pPr algn="ctr">
+              <a:spcBef>
+                <a:spcPts val="214"/>
+              </a:spcBef>
+            </a:pPr>
+            <a:r>
+              <a:rPr sz="2220" spc="-40" dirty="0">
+                <a:solidFill>
+                  <a:srgbClr val="FFFFFF"/>
+                </a:solidFill>
+                <a:latin typeface="Arial"/>
+                <a:cs typeface="Arial"/>
+              </a:rPr>
+              <a:t>FIN</a:t>
+            </a:r>
+            <a:endParaRPr sz="2220" dirty="0">
+              <a:latin typeface="Arial"/>
+              <a:cs typeface="Arial"/>
+            </a:endParaRPr>
+          </a:p>
+          <a:p>
+            <a:pPr algn="ctr">
+              <a:spcBef>
+                <a:spcPts val="1856"/>
+              </a:spcBef>
+            </a:pPr>
+            <a:r>
+              <a:rPr sz="1744" dirty="0">
+                <a:solidFill>
+                  <a:srgbClr val="FFFFFF"/>
+                </a:solidFill>
+                <a:latin typeface="Arial"/>
+                <a:cs typeface="Arial"/>
+              </a:rPr>
+              <a:t>Any</a:t>
+            </a:r>
+            <a:r>
+              <a:rPr sz="1744" spc="-95" dirty="0">
+                <a:solidFill>
+                  <a:srgbClr val="FFFFFF"/>
+                </a:solidFill>
+                <a:latin typeface="Arial"/>
+                <a:cs typeface="Arial"/>
+              </a:rPr>
+              <a:t> </a:t>
+            </a:r>
+            <a:r>
+              <a:rPr sz="1744" spc="-79" dirty="0">
+                <a:solidFill>
+                  <a:srgbClr val="FFFFFF"/>
+                </a:solidFill>
+                <a:latin typeface="Arial"/>
+                <a:cs typeface="Arial"/>
+              </a:rPr>
+              <a:t>questions?</a:t>
+            </a:r>
+            <a:endParaRPr sz="1744" dirty="0">
+              <a:latin typeface="Arial"/>
+              <a:cs typeface="Arial"/>
+            </a:endParaRPr>
+          </a:p>
+        </p:txBody>
+      </p:sp>
+    </p:spTree>
+  </p:cSld>
+  <p:clrMapOvr>
+    <a:masterClrMapping/>
+  </p:clrMapOvr>
+  <p:transition>
+    <p:cut/>
+  </p:transition>
+</p:sld>
+</file>
+
+<file path=ppt/slides/slide2.xml><?xml version="1.0" encoding="utf-8"?>
+<p:sld xmlns:a="http://schemas.openxmlformats.org/drawingml/2006/main" xmlns:r="http://schemas.openxmlformats.org/officeDocument/2006/relationships" xmlns:p="http://schemas.openxmlformats.org/presentationml/2006/main">
+  <p:cSld>
+    <p:spTree>
+      <p:nvGrpSpPr>
+        <p:cNvPr id="1" name="">
+          <a:extLst>
+            <a:ext uri="{FF2B5EF4-FFF2-40B4-BE49-F238E27FC236}">
+              <a16:creationId xmlns:a16="http://schemas.microsoft.com/office/drawing/2014/main" id="{F543C119-CD6A-5FC9-26A0-385DC10665D3}"/>
+            </a:ext>
+          </a:extLst>
+        </p:cNvPr>
+        <p:cNvGrpSpPr/>
+        <p:nvPr/>
+      </p:nvGrpSpPr>
+      <p:grpSpPr>
+        <a:xfrm>
+          <a:off x="0" y="0"/>
+          <a:ext cx="0" cy="0"/>
+          <a:chOff x="0" y="0"/>
+          <a:chExt cx="0" cy="0"/>
+        </a:xfrm>
+      </p:grpSpPr>
+      <p:sp>
+        <p:nvSpPr>
           <p:cNvPr id="2" name="Title 1">
             <a:extLst>
               <a:ext uri="{FF2B5EF4-FFF2-40B4-BE49-F238E27FC236}">
-                <a16:creationId xmlns:a16="http://schemas.microsoft.com/office/drawing/2014/main" id="{12B5478E-4383-FD38-8D6B-D48FFD791DA0}"/>
+                <a16:creationId xmlns:a16="http://schemas.microsoft.com/office/drawing/2014/main" id="{27B1E4F8-8D09-4B7F-E74B-DF21E13690F9}"/>
               </a:ext>
             </a:extLst>
           </p:cNvPr>
@@ -5962,12 +9184,9 @@
             <a:pPr algn="ctr"/>
             <a:r>
               <a:rPr lang="en-US" altLang="zh-CN" sz="3600" dirty="0"/>
-              <a:t>Compare </a:t>
-            </a:r>
-            <a:r>
-              <a:rPr lang="en-US" sz="3600" dirty="0"/>
-              <a:t>SQL Joins</a:t>
-            </a:r>
+              <a:t>Tutorial Structure</a:t>
+            </a:r>
+            <a:endParaRPr lang="en-US" sz="3600" dirty="0"/>
           </a:p>
         </p:txBody>
       </p:sp>
@@ -5976,7 +9195,7 @@
           <p:cNvPr id="3" name="Content Placeholder 2">
             <a:extLst>
               <a:ext uri="{FF2B5EF4-FFF2-40B4-BE49-F238E27FC236}">
-                <a16:creationId xmlns:a16="http://schemas.microsoft.com/office/drawing/2014/main" id="{0B7ECC00-F701-1593-A54B-7EB079506904}"/>
+                <a16:creationId xmlns:a16="http://schemas.microsoft.com/office/drawing/2014/main" id="{83520C3C-7CF3-DE0F-A57F-3B88A1126724}"/>
               </a:ext>
             </a:extLst>
           </p:cNvPr>
@@ -5994,33 +9213,34 @@
           <a:p>
             <a:r>
               <a:rPr lang="en-US" sz="2400" dirty="0"/>
-              <a:t>Cartesian Product (×)</a:t>
+              <a:t>Covers additional material if needed</a:t>
             </a:r>
           </a:p>
           <a:p>
             <a:r>
               <a:rPr lang="en-US" sz="2400" dirty="0"/>
-              <a:t>Theta Join (⋈</a:t>
-            </a:r>
-            <a:r>
-              <a:rPr lang="en-US" altLang="zh-CN" sz="2400" baseline="-25000" dirty="0"/>
-              <a:t>θ</a:t>
-            </a:r>
+              <a:t>Questions that you can try</a:t>
+            </a:r>
+          </a:p>
+          <a:p>
             <a:r>
               <a:rPr lang="en-US" sz="2400" dirty="0"/>
-              <a:t>)</a:t>
-            </a:r>
-          </a:p>
-          <a:p>
-            <a:r>
-              <a:rPr lang="en-US" sz="2400" dirty="0"/>
-              <a:t>Natural Join (⋈)</a:t>
-            </a:r>
-          </a:p>
-          <a:p>
-            <a:r>
-              <a:rPr lang="en-US" sz="2400" dirty="0"/>
-              <a:t>Key Differences</a:t>
+              <a:t>Answering questions</a:t>
+            </a:r>
+          </a:p>
+          <a:p>
+            <a:pPr marL="0" indent="0">
+              <a:buNone/>
+            </a:pPr>
+            <a:endParaRPr lang="en-US" sz="2400" dirty="0"/>
+          </a:p>
+          <a:p>
+            <a:pPr marL="0" indent="0">
+              <a:buNone/>
+            </a:pPr>
+            <a:r>
+              <a:rPr lang="en-US" sz="2400" i="1" dirty="0"/>
+              <a:t>(Top-left corner: QR code of this slide)</a:t>
             </a:r>
           </a:p>
         </p:txBody>
@@ -6030,7 +9250,7 @@
           <p:cNvPr id="4" name="Slide Number Placeholder 3">
             <a:extLst>
               <a:ext uri="{FF2B5EF4-FFF2-40B4-BE49-F238E27FC236}">
-                <a16:creationId xmlns:a16="http://schemas.microsoft.com/office/drawing/2014/main" id="{2E8A268A-533D-D156-7901-07A43287F43B}"/>
+                <a16:creationId xmlns:a16="http://schemas.microsoft.com/office/drawing/2014/main" id="{0BEF0073-15A6-2806-3D39-728845891C92}"/>
               </a:ext>
             </a:extLst>
           </p:cNvPr>
@@ -6055,6 +9275,387 @@
                 <a:defRPr/>
               </a:pPr>
               <a:t>2</a:t>
+            </a:fld>
+            <a:endParaRPr lang="en-US" altLang="en-US" dirty="0"/>
+          </a:p>
+        </p:txBody>
+      </p:sp>
+    </p:spTree>
+    <p:extLst>
+      <p:ext uri="{BB962C8B-B14F-4D97-AF65-F5344CB8AC3E}">
+        <p14:creationId xmlns:p14="http://schemas.microsoft.com/office/powerpoint/2010/main" val="2041432591"/>
+      </p:ext>
+    </p:extLst>
+  </p:cSld>
+  <p:clrMapOvr>
+    <a:masterClrMapping/>
+  </p:clrMapOvr>
+  <p:timing>
+    <p:tnLst>
+      <p:par>
+        <p:cTn id="1" dur="indefinite" restart="never" nodeType="tmRoot">
+          <p:childTnLst>
+            <p:seq concurrent="1" nextAc="seek">
+              <p:cTn id="2" dur="indefinite" nodeType="mainSeq">
+                <p:childTnLst>
+                  <p:par>
+                    <p:cTn id="3" fill="hold">
+                      <p:stCondLst>
+                        <p:cond delay="indefinite"/>
+                      </p:stCondLst>
+                      <p:childTnLst>
+                        <p:par>
+                          <p:cTn id="4" fill="hold">
+                            <p:stCondLst>
+                              <p:cond delay="0"/>
+                            </p:stCondLst>
+                            <p:childTnLst>
+                              <p:par>
+                                <p:cTn id="5" presetID="1" presetClass="entr" presetSubtype="0" fill="hold" grpId="0" nodeType="clickEffect">
+                                  <p:stCondLst>
+                                    <p:cond delay="0"/>
+                                  </p:stCondLst>
+                                  <p:childTnLst>
+                                    <p:set>
+                                      <p:cBhvr>
+                                        <p:cTn id="6" dur="1" fill="hold">
+                                          <p:stCondLst>
+                                            <p:cond delay="0"/>
+                                          </p:stCondLst>
+                                        </p:cTn>
+                                        <p:tgtEl>
+                                          <p:spTgt spid="3">
+                                            <p:txEl>
+                                              <p:pRg st="0" end="0"/>
+                                            </p:txEl>
+                                          </p:spTgt>
+                                        </p:tgtEl>
+                                        <p:attrNameLst>
+                                          <p:attrName>style.visibility</p:attrName>
+                                        </p:attrNameLst>
+                                      </p:cBhvr>
+                                      <p:to>
+                                        <p:strVal val="visible"/>
+                                      </p:to>
+                                    </p:set>
+                                  </p:childTnLst>
+                                </p:cTn>
+                              </p:par>
+                            </p:childTnLst>
+                          </p:cTn>
+                        </p:par>
+                      </p:childTnLst>
+                    </p:cTn>
+                  </p:par>
+                  <p:par>
+                    <p:cTn id="7" fill="hold">
+                      <p:stCondLst>
+                        <p:cond delay="indefinite"/>
+                      </p:stCondLst>
+                      <p:childTnLst>
+                        <p:par>
+                          <p:cTn id="8" fill="hold">
+                            <p:stCondLst>
+                              <p:cond delay="0"/>
+                            </p:stCondLst>
+                            <p:childTnLst>
+                              <p:par>
+                                <p:cTn id="9" presetID="1" presetClass="entr" presetSubtype="0" fill="hold" grpId="0" nodeType="clickEffect">
+                                  <p:stCondLst>
+                                    <p:cond delay="0"/>
+                                  </p:stCondLst>
+                                  <p:childTnLst>
+                                    <p:set>
+                                      <p:cBhvr>
+                                        <p:cTn id="10" dur="1" fill="hold">
+                                          <p:stCondLst>
+                                            <p:cond delay="0"/>
+                                          </p:stCondLst>
+                                        </p:cTn>
+                                        <p:tgtEl>
+                                          <p:spTgt spid="3">
+                                            <p:txEl>
+                                              <p:pRg st="1" end="1"/>
+                                            </p:txEl>
+                                          </p:spTgt>
+                                        </p:tgtEl>
+                                        <p:attrNameLst>
+                                          <p:attrName>style.visibility</p:attrName>
+                                        </p:attrNameLst>
+                                      </p:cBhvr>
+                                      <p:to>
+                                        <p:strVal val="visible"/>
+                                      </p:to>
+                                    </p:set>
+                                  </p:childTnLst>
+                                </p:cTn>
+                              </p:par>
+                            </p:childTnLst>
+                          </p:cTn>
+                        </p:par>
+                      </p:childTnLst>
+                    </p:cTn>
+                  </p:par>
+                  <p:par>
+                    <p:cTn id="11" fill="hold">
+                      <p:stCondLst>
+                        <p:cond delay="indefinite"/>
+                      </p:stCondLst>
+                      <p:childTnLst>
+                        <p:par>
+                          <p:cTn id="12" fill="hold">
+                            <p:stCondLst>
+                              <p:cond delay="0"/>
+                            </p:stCondLst>
+                            <p:childTnLst>
+                              <p:par>
+                                <p:cTn id="13" presetID="1" presetClass="entr" presetSubtype="0" fill="hold" grpId="0" nodeType="clickEffect">
+                                  <p:stCondLst>
+                                    <p:cond delay="0"/>
+                                  </p:stCondLst>
+                                  <p:childTnLst>
+                                    <p:set>
+                                      <p:cBhvr>
+                                        <p:cTn id="14" dur="1" fill="hold">
+                                          <p:stCondLst>
+                                            <p:cond delay="0"/>
+                                          </p:stCondLst>
+                                        </p:cTn>
+                                        <p:tgtEl>
+                                          <p:spTgt spid="3">
+                                            <p:txEl>
+                                              <p:pRg st="2" end="2"/>
+                                            </p:txEl>
+                                          </p:spTgt>
+                                        </p:tgtEl>
+                                        <p:attrNameLst>
+                                          <p:attrName>style.visibility</p:attrName>
+                                        </p:attrNameLst>
+                                      </p:cBhvr>
+                                      <p:to>
+                                        <p:strVal val="visible"/>
+                                      </p:to>
+                                    </p:set>
+                                  </p:childTnLst>
+                                </p:cTn>
+                              </p:par>
+                            </p:childTnLst>
+                          </p:cTn>
+                        </p:par>
+                      </p:childTnLst>
+                    </p:cTn>
+                  </p:par>
+                  <p:par>
+                    <p:cTn id="15" fill="hold">
+                      <p:stCondLst>
+                        <p:cond delay="indefinite"/>
+                      </p:stCondLst>
+                      <p:childTnLst>
+                        <p:par>
+                          <p:cTn id="16" fill="hold">
+                            <p:stCondLst>
+                              <p:cond delay="0"/>
+                            </p:stCondLst>
+                            <p:childTnLst>
+                              <p:par>
+                                <p:cTn id="17" presetID="1" presetClass="entr" presetSubtype="0" fill="hold" grpId="0" nodeType="clickEffect">
+                                  <p:stCondLst>
+                                    <p:cond delay="0"/>
+                                  </p:stCondLst>
+                                  <p:childTnLst>
+                                    <p:set>
+                                      <p:cBhvr>
+                                        <p:cTn id="18" dur="1" fill="hold">
+                                          <p:stCondLst>
+                                            <p:cond delay="0"/>
+                                          </p:stCondLst>
+                                        </p:cTn>
+                                        <p:tgtEl>
+                                          <p:spTgt spid="3">
+                                            <p:txEl>
+                                              <p:pRg st="4" end="4"/>
+                                            </p:txEl>
+                                          </p:spTgt>
+                                        </p:tgtEl>
+                                        <p:attrNameLst>
+                                          <p:attrName>style.visibility</p:attrName>
+                                        </p:attrNameLst>
+                                      </p:cBhvr>
+                                      <p:to>
+                                        <p:strVal val="visible"/>
+                                      </p:to>
+                                    </p:set>
+                                  </p:childTnLst>
+                                </p:cTn>
+                              </p:par>
+                            </p:childTnLst>
+                          </p:cTn>
+                        </p:par>
+                      </p:childTnLst>
+                    </p:cTn>
+                  </p:par>
+                </p:childTnLst>
+              </p:cTn>
+              <p:prevCondLst>
+                <p:cond evt="onPrev" delay="0">
+                  <p:tgtEl>
+                    <p:sldTgt/>
+                  </p:tgtEl>
+                </p:cond>
+              </p:prevCondLst>
+              <p:nextCondLst>
+                <p:cond evt="onNext" delay="0">
+                  <p:tgtEl>
+                    <p:sldTgt/>
+                  </p:tgtEl>
+                </p:cond>
+              </p:nextCondLst>
+            </p:seq>
+          </p:childTnLst>
+        </p:cTn>
+      </p:par>
+    </p:tnLst>
+    <p:bldLst>
+      <p:bldP spid="3" grpId="0" build="p"/>
+    </p:bldLst>
+  </p:timing>
+</p:sld>
+</file>
+
+<file path=ppt/slides/slide3.xml><?xml version="1.0" encoding="utf-8"?>
+<p:sld xmlns:a="http://schemas.openxmlformats.org/drawingml/2006/main" xmlns:r="http://schemas.openxmlformats.org/officeDocument/2006/relationships" xmlns:p="http://schemas.openxmlformats.org/presentationml/2006/main">
+  <p:cSld>
+    <p:spTree>
+      <p:nvGrpSpPr>
+        <p:cNvPr id="1" name=""/>
+        <p:cNvGrpSpPr/>
+        <p:nvPr/>
+      </p:nvGrpSpPr>
+      <p:grpSpPr>
+        <a:xfrm>
+          <a:off x="0" y="0"/>
+          <a:ext cx="0" cy="0"/>
+          <a:chOff x="0" y="0"/>
+          <a:chExt cx="0" cy="0"/>
+        </a:xfrm>
+      </p:grpSpPr>
+      <p:sp>
+        <p:nvSpPr>
+          <p:cNvPr id="2" name="Title 1">
+            <a:extLst>
+              <a:ext uri="{FF2B5EF4-FFF2-40B4-BE49-F238E27FC236}">
+                <a16:creationId xmlns:a16="http://schemas.microsoft.com/office/drawing/2014/main" id="{12B5478E-4383-FD38-8D6B-D48FFD791DA0}"/>
+              </a:ext>
+            </a:extLst>
+          </p:cNvPr>
+          <p:cNvSpPr>
+            <a:spLocks noGrp="1"/>
+          </p:cNvSpPr>
+          <p:nvPr>
+            <p:ph type="title"/>
+          </p:nvPr>
+        </p:nvSpPr>
+        <p:spPr/>
+        <p:txBody>
+          <a:bodyPr/>
+          <a:lstStyle/>
+          <a:p>
+            <a:pPr algn="ctr"/>
+            <a:r>
+              <a:rPr lang="en-US" altLang="zh-CN" sz="3600" dirty="0"/>
+              <a:t>Compare </a:t>
+            </a:r>
+            <a:r>
+              <a:rPr lang="en-US" sz="3600" dirty="0"/>
+              <a:t>SQL Joins</a:t>
+            </a:r>
+          </a:p>
+        </p:txBody>
+      </p:sp>
+      <p:sp>
+        <p:nvSpPr>
+          <p:cNvPr id="3" name="Content Placeholder 2">
+            <a:extLst>
+              <a:ext uri="{FF2B5EF4-FFF2-40B4-BE49-F238E27FC236}">
+                <a16:creationId xmlns:a16="http://schemas.microsoft.com/office/drawing/2014/main" id="{0B7ECC00-F701-1593-A54B-7EB079506904}"/>
+              </a:ext>
+            </a:extLst>
+          </p:cNvPr>
+          <p:cNvSpPr>
+            <a:spLocks noGrp="1"/>
+          </p:cNvSpPr>
+          <p:nvPr>
+            <p:ph idx="1"/>
+          </p:nvPr>
+        </p:nvSpPr>
+        <p:spPr/>
+        <p:txBody>
+          <a:bodyPr/>
+          <a:lstStyle/>
+          <a:p>
+            <a:r>
+              <a:rPr lang="en-US" sz="2400" dirty="0"/>
+              <a:t>Cartesian Product (×)</a:t>
+            </a:r>
+          </a:p>
+          <a:p>
+            <a:r>
+              <a:rPr lang="en-US" sz="2400" dirty="0"/>
+              <a:t>Theta Join (⋈</a:t>
+            </a:r>
+            <a:r>
+              <a:rPr lang="en-US" altLang="zh-CN" sz="2400" baseline="-25000" dirty="0"/>
+              <a:t>θ</a:t>
+            </a:r>
+            <a:r>
+              <a:rPr lang="en-US" sz="2400" dirty="0"/>
+              <a:t>)</a:t>
+            </a:r>
+          </a:p>
+          <a:p>
+            <a:r>
+              <a:rPr lang="en-US" sz="2400" dirty="0"/>
+              <a:t>Natural Join (⋈)</a:t>
+            </a:r>
+          </a:p>
+          <a:p>
+            <a:r>
+              <a:rPr lang="en-US" sz="2400" dirty="0"/>
+              <a:t>Key Differences</a:t>
+            </a:r>
+          </a:p>
+        </p:txBody>
+      </p:sp>
+      <p:sp>
+        <p:nvSpPr>
+          <p:cNvPr id="4" name="Slide Number Placeholder 3">
+            <a:extLst>
+              <a:ext uri="{FF2B5EF4-FFF2-40B4-BE49-F238E27FC236}">
+                <a16:creationId xmlns:a16="http://schemas.microsoft.com/office/drawing/2014/main" id="{2E8A268A-533D-D156-7901-07A43287F43B}"/>
+              </a:ext>
+            </a:extLst>
+          </p:cNvPr>
+          <p:cNvSpPr>
+            <a:spLocks noGrp="1"/>
+          </p:cNvSpPr>
+          <p:nvPr>
+            <p:ph type="sldNum" sz="quarter" idx="10"/>
+          </p:nvPr>
+        </p:nvSpPr>
+        <p:spPr/>
+        <p:txBody>
+          <a:bodyPr/>
+          <a:lstStyle/>
+          <a:p>
+            <a:pPr>
+              <a:defRPr/>
+            </a:pPr>
+            <a:fld id="{547F3CAF-32BF-49A6-93F1-59C9E4B7C957}" type="slidenum">
+              <a:rPr lang="en-US" altLang="en-US" smtClean="0"/>
+              <a:pPr>
+                <a:defRPr/>
+              </a:pPr>
+              <a:t>3</a:t>
             </a:fld>
             <a:endParaRPr lang="en-US" altLang="en-US" dirty="0"/>
           </a:p>
@@ -6299,7 +9900,7 @@
 </p:sld>
 </file>
 
-<file path=ppt/slides/slide3.xml><?xml version="1.0" encoding="utf-8"?>
+<file path=ppt/slides/slide4.xml><?xml version="1.0" encoding="utf-8"?>
 <p:sld xmlns:a="http://schemas.openxmlformats.org/drawingml/2006/main" xmlns:r="http://schemas.openxmlformats.org/officeDocument/2006/relationships" xmlns:p="http://schemas.openxmlformats.org/presentationml/2006/main">
   <p:cSld>
     <p:spTree>
@@ -6422,7 +10023,7 @@
               <a:pPr>
                 <a:defRPr/>
               </a:pPr>
-              <a:t>3</a:t>
+              <a:t>4</a:t>
             </a:fld>
             <a:endParaRPr lang="en-US" altLang="en-US" dirty="0"/>
           </a:p>
@@ -6618,7 +10219,7 @@
 </p:sld>
 </file>
 
-<file path=ppt/slides/slide4.xml><?xml version="1.0" encoding="utf-8"?>
+<file path=ppt/slides/slide5.xml><?xml version="1.0" encoding="utf-8"?>
 <p:sld xmlns:a="http://schemas.openxmlformats.org/drawingml/2006/main" xmlns:r="http://schemas.openxmlformats.org/officeDocument/2006/relationships" xmlns:p="http://schemas.openxmlformats.org/presentationml/2006/main">
   <p:cSld>
     <p:spTree>
@@ -6650,14 +10251,26 @@
           <p:nvPr/>
         </p:nvPicPr>
         <p:blipFill>
-          <a:blip r:embed="rId3"/>
+          <a:blip r:embed="rId3">
+            <a:clrChange>
+              <a:clrFrom>
+                <a:srgbClr val="FFFFFF"/>
+              </a:clrFrom>
+              <a:clrTo>
+                <a:srgbClr val="FFFFFF">
+                  <a:alpha val="0"/>
+                </a:srgbClr>
+              </a:clrTo>
+            </a:clrChange>
+            <a:alphaModFix/>
+          </a:blip>
           <a:stretch>
             <a:fillRect/>
           </a:stretch>
         </p:blipFill>
         <p:spPr>
           <a:xfrm>
-            <a:off x="117099" y="603250"/>
+            <a:off x="230605" y="671512"/>
             <a:ext cx="8682790" cy="6186488"/>
           </a:xfrm>
           <a:prstGeom prst="rect">
@@ -6701,7 +10314,7 @@
                 </a:spcAft>
                 <a:defRPr/>
               </a:pPr>
-              <a:t>4</a:t>
+              <a:t>5</a:t>
             </a:fld>
             <a:endParaRPr lang="en-US" altLang="en-US"/>
           </a:p>
@@ -6720,7 +10333,7 @@
 </p:sld>
 </file>
 
-<file path=ppt/slides/slide5.xml><?xml version="1.0" encoding="utf-8"?>
+<file path=ppt/slides/slide6.xml><?xml version="1.0" encoding="utf-8"?>
 <p:sld xmlns:a="http://schemas.openxmlformats.org/drawingml/2006/main" xmlns:r="http://schemas.openxmlformats.org/officeDocument/2006/relationships" xmlns:p="http://schemas.openxmlformats.org/presentationml/2006/main">
   <p:cSld>
     <p:spTree>
@@ -6917,7 +10530,7 @@
               <a:pPr>
                 <a:defRPr/>
               </a:pPr>
-              <a:t>5</a:t>
+              <a:t>6</a:t>
             </a:fld>
             <a:endParaRPr lang="en-US" altLang="en-US" dirty="0"/>
           </a:p>
@@ -7214,7 +10827,7 @@
 </p:sld>
 </file>
 
-<file path=ppt/slides/slide6.xml><?xml version="1.0" encoding="utf-8"?>
+<file path=ppt/slides/slide7.xml><?xml version="1.0" encoding="utf-8"?>
 <p:sld xmlns:a="http://schemas.openxmlformats.org/drawingml/2006/main" xmlns:r="http://schemas.openxmlformats.org/officeDocument/2006/relationships" xmlns:p="http://schemas.openxmlformats.org/presentationml/2006/main">
   <p:cSld>
     <p:spTree>
@@ -7372,7 +10985,7 @@
               <a:pPr>
                 <a:defRPr/>
               </a:pPr>
-              <a:t>6</a:t>
+              <a:t>7</a:t>
             </a:fld>
             <a:endParaRPr lang="en-US" altLang="en-US" dirty="0"/>
           </a:p>
@@ -7620,7 +11233,7 @@
 </p:sld>
 </file>
 
-<file path=ppt/slides/slide7.xml><?xml version="1.0" encoding="utf-8"?>
+<file path=ppt/slides/slide8.xml><?xml version="1.0" encoding="utf-8"?>
 <p:sld xmlns:a="http://schemas.openxmlformats.org/drawingml/2006/main" xmlns:r="http://schemas.openxmlformats.org/officeDocument/2006/relationships" xmlns:p="http://schemas.openxmlformats.org/presentationml/2006/main">
   <p:cSld>
     <p:spTree>
@@ -7750,7 +11363,7 @@
               <a:pPr>
                 <a:defRPr/>
               </a:pPr>
-              <a:t>7</a:t>
+              <a:t>8</a:t>
             </a:fld>
             <a:endParaRPr lang="en-US" altLang="en-US" dirty="0"/>
           </a:p>
@@ -7946,7 +11559,7 @@
 </p:sld>
 </file>
 
-<file path=ppt/slides/slide8.xml><?xml version="1.0" encoding="utf-8"?>
+<file path=ppt/slides/slide9.xml><?xml version="1.0" encoding="utf-8"?>
 <p:sld xmlns:a="http://schemas.openxmlformats.org/drawingml/2006/main" xmlns:r="http://schemas.openxmlformats.org/officeDocument/2006/relationships" xmlns:p="http://schemas.openxmlformats.org/presentationml/2006/main">
   <p:cSld>
     <p:spTree>
@@ -7965,168 +11578,387 @@
       </p:grpSpPr>
       <p:sp>
         <p:nvSpPr>
-          <p:cNvPr id="2" name="object 2"/>
-          <p:cNvSpPr/>
-          <p:nvPr/>
-        </p:nvSpPr>
-        <p:spPr>
-          <a:xfrm>
-            <a:off x="0" y="0"/>
-            <a:ext cx="9144000" cy="6858000"/>
-          </a:xfrm>
-          <a:custGeom>
-            <a:avLst/>
-            <a:gdLst/>
-            <a:ahLst/>
-            <a:cxnLst/>
-            <a:rect l="l" t="t" r="r" b="b"/>
-            <a:pathLst>
-              <a:path w="5760085" h="3240405">
-                <a:moveTo>
-                  <a:pt x="5759996" y="0"/>
-                </a:moveTo>
-                <a:lnTo>
-                  <a:pt x="0" y="0"/>
-                </a:lnTo>
-                <a:lnTo>
-                  <a:pt x="0" y="3239998"/>
-                </a:lnTo>
-                <a:lnTo>
-                  <a:pt x="5759996" y="3239998"/>
-                </a:lnTo>
-                <a:lnTo>
-                  <a:pt x="5759996" y="0"/>
-                </a:lnTo>
-                <a:close/>
-              </a:path>
-            </a:pathLst>
-          </a:custGeom>
-          <a:solidFill>
-            <a:srgbClr val="0054A0"/>
-          </a:solidFill>
-        </p:spPr>
+          <p:cNvPr id="2" name="Title 1">
+            <a:extLst>
+              <a:ext uri="{FF2B5EF4-FFF2-40B4-BE49-F238E27FC236}">
+                <a16:creationId xmlns:a16="http://schemas.microsoft.com/office/drawing/2014/main" id="{D682E305-896F-E40A-9963-9E04CBF77E4F}"/>
+              </a:ext>
+            </a:extLst>
+          </p:cNvPr>
+          <p:cNvSpPr>
+            <a:spLocks noGrp="1"/>
+          </p:cNvSpPr>
+          <p:nvPr>
+            <p:ph type="title"/>
+          </p:nvPr>
+        </p:nvSpPr>
+        <p:spPr/>
         <p:txBody>
-          <a:bodyPr wrap="square" lIns="0" tIns="0" rIns="0" bIns="0" rtlCol="0"/>
+          <a:bodyPr/>
           <a:lstStyle/>
           <a:p>
-            <a:endParaRPr sz="2537"/>
+            <a:pPr algn="ctr"/>
+            <a:r>
+              <a:rPr lang="en-NZ" sz="3600" dirty="0"/>
+              <a:t>Exercises</a:t>
+            </a:r>
+            <a:endParaRPr lang="en-US" sz="3600" dirty="0"/>
           </a:p>
         </p:txBody>
       </p:sp>
-      <p:pic>
-        <p:nvPicPr>
-          <p:cNvPr id="3" name="object 3"/>
-          <p:cNvPicPr/>
-          <p:nvPr/>
-        </p:nvPicPr>
-        <p:blipFill>
-          <a:blip r:embed="rId3" cstate="print"/>
-          <a:stretch>
-            <a:fillRect/>
-          </a:stretch>
-        </p:blipFill>
-        <p:spPr>
-          <a:xfrm>
-            <a:off x="6435597" y="346486"/>
-            <a:ext cx="2492957" cy="488217"/>
-          </a:xfrm>
-          <a:prstGeom prst="rect">
-            <a:avLst/>
-          </a:prstGeom>
-        </p:spPr>
-      </p:pic>
-      <p:sp>
-        <p:nvSpPr>
-          <p:cNvPr id="4" name="object 4"/>
-          <p:cNvSpPr txBox="1"/>
-          <p:nvPr/>
-        </p:nvSpPr>
-        <p:spPr>
-          <a:xfrm>
-            <a:off x="3853912" y="3160315"/>
-            <a:ext cx="1427995" cy="881151"/>
-          </a:xfrm>
-          <a:prstGeom prst="rect">
-            <a:avLst/>
-          </a:prstGeom>
-        </p:spPr>
+      <p:sp>
+        <p:nvSpPr>
+          <p:cNvPr id="3" name="Content Placeholder 2">
+            <a:extLst>
+              <a:ext uri="{FF2B5EF4-FFF2-40B4-BE49-F238E27FC236}">
+                <a16:creationId xmlns:a16="http://schemas.microsoft.com/office/drawing/2014/main" id="{C5E0A8E7-E77E-1B5E-1808-8B6AB4D978BA}"/>
+              </a:ext>
+            </a:extLst>
+          </p:cNvPr>
+          <p:cNvSpPr>
+            <a:spLocks noGrp="1"/>
+          </p:cNvSpPr>
+          <p:nvPr>
+            <p:ph idx="1"/>
+          </p:nvPr>
+        </p:nvSpPr>
+        <p:spPr/>
         <p:txBody>
-          <a:bodyPr vert="horz" wrap="square" lIns="0" tIns="27190" rIns="0" bIns="0" rtlCol="0">
-            <a:spAutoFit/>
-          </a:bodyPr>
+          <a:bodyPr/>
           <a:lstStyle/>
           <a:p>
-            <a:pPr algn="ctr">
-              <a:spcBef>
-                <a:spcPts val="214"/>
-              </a:spcBef>
+            <a:pPr algn="l"/>
+            <a:r>
+              <a:rPr lang="en-US" sz="1800" b="0" i="1" u="none" strike="noStrike" baseline="0" dirty="0">
+                <a:latin typeface="+mj-lt"/>
+              </a:rPr>
+              <a:t>branch</a:t>
+            </a:r>
+            <a:r>
+              <a:rPr lang="en-US" sz="1800" b="0" i="0" u="none" strike="noStrike" baseline="0" dirty="0">
+                <a:latin typeface="+mj-lt"/>
+              </a:rPr>
+              <a:t>(</a:t>
+            </a:r>
+            <a:r>
+              <a:rPr lang="en-US" sz="1800" b="0" i="1" u="none" strike="noStrike" baseline="0" dirty="0">
+                <a:latin typeface="+mj-lt"/>
+              </a:rPr>
+              <a:t>branch name</a:t>
+            </a:r>
+            <a:r>
+              <a:rPr lang="en-US" sz="1800" b="0" i="0" u="none" strike="noStrike" baseline="0" dirty="0">
+                <a:latin typeface="+mj-lt"/>
+              </a:rPr>
+              <a:t>, </a:t>
+            </a:r>
+            <a:r>
+              <a:rPr lang="en-US" sz="1800" b="0" i="1" u="none" strike="noStrike" baseline="0" dirty="0">
+                <a:latin typeface="+mj-lt"/>
+              </a:rPr>
+              <a:t>branch city, assets</a:t>
+            </a:r>
+            <a:r>
+              <a:rPr lang="en-US" sz="1800" b="0" i="0" u="none" strike="noStrike" baseline="0" dirty="0">
+                <a:latin typeface="+mj-lt"/>
+              </a:rPr>
+              <a:t>)</a:t>
+            </a:r>
+          </a:p>
+          <a:p>
+            <a:pPr algn="l"/>
+            <a:r>
+              <a:rPr lang="en-US" sz="1800" b="0" i="1" u="none" strike="noStrike" baseline="0" dirty="0">
+                <a:latin typeface="+mj-lt"/>
+              </a:rPr>
+              <a:t>customer </a:t>
+            </a:r>
+            <a:r>
+              <a:rPr lang="en-US" sz="1800" b="0" i="0" u="none" strike="noStrike" baseline="0" dirty="0">
+                <a:latin typeface="+mj-lt"/>
+              </a:rPr>
+              <a:t>(</a:t>
+            </a:r>
+            <a:r>
+              <a:rPr lang="en-US" sz="1800" b="0" i="1" u="none" strike="noStrike" baseline="0" dirty="0">
+                <a:latin typeface="+mj-lt"/>
+              </a:rPr>
+              <a:t>ID</a:t>
+            </a:r>
+            <a:r>
+              <a:rPr lang="en-US" sz="1800" b="0" i="0" u="none" strike="noStrike" baseline="0" dirty="0">
+                <a:latin typeface="+mj-lt"/>
+              </a:rPr>
+              <a:t>, </a:t>
+            </a:r>
+            <a:r>
+              <a:rPr lang="en-US" sz="1800" b="0" i="1" u="none" strike="noStrike" baseline="0" dirty="0">
+                <a:latin typeface="+mj-lt"/>
+              </a:rPr>
+              <a:t>customer name</a:t>
+            </a:r>
+            <a:r>
+              <a:rPr lang="en-US" sz="1800" b="0" i="0" u="none" strike="noStrike" baseline="0" dirty="0">
+                <a:latin typeface="+mj-lt"/>
+              </a:rPr>
+              <a:t>, </a:t>
+            </a:r>
+            <a:r>
+              <a:rPr lang="en-US" sz="1800" b="0" i="1" u="none" strike="noStrike" baseline="0" dirty="0">
+                <a:latin typeface="+mj-lt"/>
+              </a:rPr>
+              <a:t>customer street, customer city</a:t>
+            </a:r>
+            <a:r>
+              <a:rPr lang="en-US" sz="1800" b="0" i="0" u="none" strike="noStrike" baseline="0" dirty="0">
+                <a:latin typeface="+mj-lt"/>
+              </a:rPr>
+              <a:t>)</a:t>
+            </a:r>
+          </a:p>
+          <a:p>
+            <a:pPr algn="l"/>
+            <a:r>
+              <a:rPr lang="en-US" sz="1800" b="0" i="1" u="none" strike="noStrike" baseline="0" dirty="0">
+                <a:latin typeface="+mj-lt"/>
+              </a:rPr>
+              <a:t>loan </a:t>
+            </a:r>
+            <a:r>
+              <a:rPr lang="en-US" sz="1800" b="0" i="0" u="none" strike="noStrike" baseline="0" dirty="0">
+                <a:latin typeface="+mj-lt"/>
+              </a:rPr>
+              <a:t>(</a:t>
+            </a:r>
+            <a:r>
+              <a:rPr lang="en-US" sz="1800" b="0" i="1" u="none" strike="noStrike" baseline="0" dirty="0">
+                <a:latin typeface="+mj-lt"/>
+              </a:rPr>
+              <a:t>loan number</a:t>
+            </a:r>
+            <a:r>
+              <a:rPr lang="en-US" sz="1800" b="0" i="0" u="none" strike="noStrike" baseline="0" dirty="0">
+                <a:latin typeface="+mj-lt"/>
+              </a:rPr>
+              <a:t>, </a:t>
+            </a:r>
+            <a:r>
+              <a:rPr lang="en-US" sz="1800" b="0" i="1" u="none" strike="noStrike" baseline="0" dirty="0">
+                <a:latin typeface="+mj-lt"/>
+              </a:rPr>
+              <a:t>branch name, amount</a:t>
+            </a:r>
+            <a:r>
+              <a:rPr lang="en-US" sz="1800" b="0" i="0" u="none" strike="noStrike" baseline="0" dirty="0">
+                <a:latin typeface="+mj-lt"/>
+              </a:rPr>
+              <a:t>)</a:t>
+            </a:r>
+          </a:p>
+          <a:p>
+            <a:pPr algn="l"/>
+            <a:r>
+              <a:rPr lang="en-US" sz="1800" b="0" i="1" u="none" strike="noStrike" baseline="0" dirty="0">
+                <a:latin typeface="+mj-lt"/>
+              </a:rPr>
+              <a:t>borrower </a:t>
+            </a:r>
+            <a:r>
+              <a:rPr lang="en-US" sz="1800" b="0" i="0" u="none" strike="noStrike" baseline="0" dirty="0">
+                <a:latin typeface="+mj-lt"/>
+              </a:rPr>
+              <a:t>(</a:t>
+            </a:r>
+            <a:r>
+              <a:rPr lang="en-US" sz="1800" b="0" i="1" u="none" strike="noStrike" baseline="0" dirty="0">
+                <a:latin typeface="+mj-lt"/>
+              </a:rPr>
+              <a:t>ID</a:t>
+            </a:r>
+            <a:r>
+              <a:rPr lang="en-US" sz="1800" b="0" i="0" u="none" strike="noStrike" baseline="0" dirty="0">
+                <a:latin typeface="+mj-lt"/>
+              </a:rPr>
+              <a:t>, </a:t>
+            </a:r>
+            <a:r>
+              <a:rPr lang="en-US" sz="1800" b="0" i="1" u="none" strike="noStrike" baseline="0" dirty="0">
+                <a:latin typeface="+mj-lt"/>
+              </a:rPr>
+              <a:t>loan number</a:t>
+            </a:r>
+            <a:r>
+              <a:rPr lang="en-US" sz="1800" b="0" i="0" u="none" strike="noStrike" baseline="0" dirty="0">
+                <a:latin typeface="+mj-lt"/>
+              </a:rPr>
+              <a:t>)</a:t>
+            </a:r>
+          </a:p>
+          <a:p>
+            <a:pPr algn="l"/>
+            <a:r>
+              <a:rPr lang="en-US" sz="1800" b="0" i="1" u="none" strike="noStrike" baseline="0" dirty="0">
+                <a:latin typeface="+mj-lt"/>
+              </a:rPr>
+              <a:t>account </a:t>
+            </a:r>
+            <a:r>
+              <a:rPr lang="en-US" sz="1800" b="0" i="0" u="none" strike="noStrike" baseline="0" dirty="0">
+                <a:latin typeface="+mj-lt"/>
+              </a:rPr>
+              <a:t>(</a:t>
+            </a:r>
+            <a:r>
+              <a:rPr lang="en-US" sz="1800" b="0" i="1" u="none" strike="noStrike" baseline="0" dirty="0">
+                <a:latin typeface="+mj-lt"/>
+              </a:rPr>
+              <a:t>account number</a:t>
+            </a:r>
+            <a:r>
+              <a:rPr lang="en-US" sz="1800" b="0" i="0" u="none" strike="noStrike" baseline="0" dirty="0">
+                <a:latin typeface="+mj-lt"/>
+              </a:rPr>
+              <a:t>, </a:t>
+            </a:r>
+            <a:r>
+              <a:rPr lang="en-US" sz="1800" b="0" i="1" u="none" strike="noStrike" baseline="0" dirty="0">
+                <a:latin typeface="+mj-lt"/>
+              </a:rPr>
+              <a:t>branch name, balance</a:t>
+            </a:r>
+            <a:r>
+              <a:rPr lang="en-US" sz="1800" b="0" i="0" u="none" strike="noStrike" baseline="0" dirty="0">
+                <a:latin typeface="+mj-lt"/>
+              </a:rPr>
+              <a:t>)</a:t>
+            </a:r>
+          </a:p>
+          <a:p>
+            <a:pPr algn="l"/>
+            <a:r>
+              <a:rPr lang="en-US" sz="1800" b="0" i="1" u="none" strike="noStrike" baseline="0" dirty="0">
+                <a:latin typeface="+mj-lt"/>
+              </a:rPr>
+              <a:t>depositor </a:t>
+            </a:r>
+            <a:r>
+              <a:rPr lang="en-US" sz="1800" b="0" i="0" u="none" strike="noStrike" baseline="0" dirty="0">
+                <a:latin typeface="+mj-lt"/>
+              </a:rPr>
+              <a:t>(</a:t>
+            </a:r>
+            <a:r>
+              <a:rPr lang="en-US" sz="1800" b="0" i="1" u="none" strike="noStrike" baseline="0" dirty="0">
+                <a:latin typeface="+mj-lt"/>
+              </a:rPr>
+              <a:t>ID</a:t>
+            </a:r>
+            <a:r>
+              <a:rPr lang="en-US" sz="1800" b="0" i="0" u="none" strike="noStrike" baseline="0" dirty="0">
+                <a:latin typeface="+mj-lt"/>
+              </a:rPr>
+              <a:t>, </a:t>
+            </a:r>
+            <a:r>
+              <a:rPr lang="en-US" sz="1800" b="0" i="1" u="none" strike="noStrike" baseline="0" dirty="0">
+                <a:latin typeface="+mj-lt"/>
+              </a:rPr>
+              <a:t>account number</a:t>
+            </a:r>
+            <a:r>
+              <a:rPr lang="en-US" sz="1800" b="0" i="0" u="none" strike="noStrike" baseline="0" dirty="0">
+                <a:latin typeface="+mj-lt"/>
+              </a:rPr>
+              <a:t>)</a:t>
+            </a:r>
+          </a:p>
+          <a:p>
+            <a:pPr marL="0" indent="0" algn="l">
+              <a:buNone/>
             </a:pPr>
-            <a:r>
-              <a:rPr sz="2220" spc="-40" dirty="0">
-                <a:solidFill>
-                  <a:srgbClr val="FFFFFF"/>
-                </a:solidFill>
-                <a:latin typeface="Arial"/>
-                <a:cs typeface="Arial"/>
-              </a:rPr>
-              <a:t>FIN</a:t>
-            </a:r>
-            <a:endParaRPr sz="2220" dirty="0">
-              <a:latin typeface="Arial"/>
-              <a:cs typeface="Arial"/>
+            <a:endParaRPr lang="en-US" sz="1800" dirty="0">
+              <a:latin typeface="+mj-lt"/>
             </a:endParaRPr>
           </a:p>
           <a:p>
-            <a:pPr algn="ctr">
-              <a:spcBef>
-                <a:spcPts val="1856"/>
-              </a:spcBef>
+            <a:pPr marL="0" indent="0" algn="l">
+              <a:buNone/>
             </a:pPr>
             <a:r>
-              <a:rPr sz="1744" dirty="0">
-                <a:solidFill>
-                  <a:srgbClr val="FFFFFF"/>
-                </a:solidFill>
-                <a:latin typeface="Arial"/>
-                <a:cs typeface="Arial"/>
-              </a:rPr>
-              <a:t>Any</a:t>
-            </a:r>
-            <a:r>
-              <a:rPr sz="1744" spc="-95" dirty="0">
-                <a:solidFill>
-                  <a:srgbClr val="FFFFFF"/>
-                </a:solidFill>
-                <a:latin typeface="Arial"/>
-                <a:cs typeface="Arial"/>
-              </a:rPr>
-              <a:t> </a:t>
-            </a:r>
-            <a:r>
-              <a:rPr sz="1744" spc="-79" dirty="0">
-                <a:solidFill>
-                  <a:srgbClr val="FFFFFF"/>
-                </a:solidFill>
-                <a:latin typeface="Arial"/>
-                <a:cs typeface="Arial"/>
-              </a:rPr>
-              <a:t>questions?</a:t>
-            </a:r>
-            <a:endParaRPr sz="1744" dirty="0">
-              <a:latin typeface="Arial"/>
-              <a:cs typeface="Arial"/>
+              <a:rPr lang="en-US" sz="1800" b="0" i="0" u="none" strike="noStrike" baseline="0" dirty="0">
+                <a:latin typeface="+mj-lt"/>
+              </a:rPr>
+              <a:t>1. Consider this bank database. Assume that branch names and customer names uniquely identify branches and customers, but loans and accounts can be associated with more than one customer.</a:t>
+            </a:r>
+          </a:p>
+          <a:p>
+            <a:pPr algn="l"/>
+            <a:r>
+              <a:rPr lang="en-US" sz="1800" b="0" i="0" u="none" strike="noStrike" baseline="0" dirty="0">
+                <a:latin typeface="+mj-lt"/>
+              </a:rPr>
+              <a:t>What are the appropriate primary keys?</a:t>
+            </a:r>
+          </a:p>
+          <a:p>
+            <a:pPr algn="l"/>
+            <a:r>
+              <a:rPr lang="en-US" sz="1800" b="0" i="0" u="none" strike="noStrike" baseline="0" dirty="0">
+                <a:latin typeface="+mj-lt"/>
+              </a:rPr>
+              <a:t>Given your choice of primary keys, identify appropriate foreign keys.</a:t>
+            </a:r>
+            <a:endParaRPr lang="en-US" sz="2400" dirty="0">
+              <a:latin typeface="+mj-lt"/>
             </a:endParaRPr>
           </a:p>
         </p:txBody>
       </p:sp>
+      <p:sp>
+        <p:nvSpPr>
+          <p:cNvPr id="4" name="Slide Number Placeholder 3">
+            <a:extLst>
+              <a:ext uri="{FF2B5EF4-FFF2-40B4-BE49-F238E27FC236}">
+                <a16:creationId xmlns:a16="http://schemas.microsoft.com/office/drawing/2014/main" id="{470759A6-A88F-1A6A-AB5B-239556625216}"/>
+              </a:ext>
+            </a:extLst>
+          </p:cNvPr>
+          <p:cNvSpPr>
+            <a:spLocks noGrp="1"/>
+          </p:cNvSpPr>
+          <p:nvPr>
+            <p:ph type="sldNum" sz="quarter" idx="10"/>
+          </p:nvPr>
+        </p:nvSpPr>
+        <p:spPr/>
+        <p:txBody>
+          <a:bodyPr/>
+          <a:lstStyle/>
+          <a:p>
+            <a:pPr>
+              <a:defRPr/>
+            </a:pPr>
+            <a:fld id="{547F3CAF-32BF-49A6-93F1-59C9E4B7C957}" type="slidenum">
+              <a:rPr lang="en-US" altLang="en-US" smtClean="0"/>
+              <a:pPr>
+                <a:defRPr/>
+              </a:pPr>
+              <a:t>9</a:t>
+            </a:fld>
+            <a:endParaRPr lang="en-US" altLang="en-US" dirty="0"/>
+          </a:p>
+        </p:txBody>
+      </p:sp>
     </p:spTree>
+    <p:extLst>
+      <p:ext uri="{BB962C8B-B14F-4D97-AF65-F5344CB8AC3E}">
+        <p14:creationId xmlns:p14="http://schemas.microsoft.com/office/powerpoint/2010/main" val="1832417679"/>
+      </p:ext>
+    </p:extLst>
   </p:cSld>
   <p:clrMapOvr>
     <a:masterClrMapping/>
   </p:clrMapOvr>
-  <p:transition>
-    <p:cut/>
-  </p:transition>
 </p:sld>
 </file>
 
@@ -9239,4 +13071,24 @@
   </a:objectDefaults>
   <a:extraClrSchemeLst/>
 </a:theme>
+</file>
+
+<file path=ppt/webextensions/taskpanes.xml><?xml version="1.0" encoding="utf-8"?>
+<wetp:taskpanes xmlns:wetp="http://schemas.microsoft.com/office/webextensions/taskpanes/2010/11">
+  <wetp:taskpane dockstate="right" visibility="1" width="350" row="0">
+    <wetp:webextensionref xmlns:r="http://schemas.openxmlformats.org/officeDocument/2006/relationships" r:id="rId1"/>
+  </wetp:taskpane>
+</wetp:taskpanes>
+</file>
+
+<file path=ppt/webextensions/webextension1.xml><?xml version="1.0" encoding="utf-8"?>
+<we:webextension xmlns:we="http://schemas.microsoft.com/office/webextensions/webextension/2010/11" id="{AA6FDB9C-DC10-41AE-B7EB-794CCE0ED496}">
+  <we:reference id="wa104051163" version="1.2.0.3" store="en-US" storeType="OMEX"/>
+  <we:alternateReferences>
+    <we:reference id="WA104051163" version="1.2.0.3" store="WA104051163" storeType="OMEX"/>
+  </we:alternateReferences>
+  <we:properties/>
+  <we:bindings/>
+  <we:snapshot xmlns:r="http://schemas.openxmlformats.org/officeDocument/2006/relationships"/>
+</we:webextension>
 </file>
</xml_diff>